<commit_message>
updated for the presentation
</commit_message>
<xml_diff>
--- a/Interviewing for a DBA job and how to Wow your new company.pptx
+++ b/Interviewing for a DBA job and how to Wow your new company.pptx
@@ -5,21 +5,25 @@
     <p:sldMasterId id="2147483648" r:id="rId1"/>
   </p:sldMasterIdLst>
   <p:notesMasterIdLst>
-    <p:notesMasterId r:id="rId14"/>
+    <p:notesMasterId r:id="rId18"/>
   </p:notesMasterIdLst>
   <p:sldIdLst>
     <p:sldId id="256" r:id="rId2"/>
-    <p:sldId id="265" r:id="rId3"/>
-    <p:sldId id="268" r:id="rId4"/>
-    <p:sldId id="257" r:id="rId5"/>
-    <p:sldId id="258" r:id="rId6"/>
-    <p:sldId id="259" r:id="rId7"/>
-    <p:sldId id="266" r:id="rId8"/>
-    <p:sldId id="260" r:id="rId9"/>
-    <p:sldId id="261" r:id="rId10"/>
-    <p:sldId id="262" r:id="rId11"/>
-    <p:sldId id="263" r:id="rId12"/>
-    <p:sldId id="269" r:id="rId13"/>
+    <p:sldId id="334" r:id="rId3"/>
+    <p:sldId id="336" r:id="rId4"/>
+    <p:sldId id="265" r:id="rId5"/>
+    <p:sldId id="268" r:id="rId6"/>
+    <p:sldId id="257" r:id="rId7"/>
+    <p:sldId id="258" r:id="rId8"/>
+    <p:sldId id="259" r:id="rId9"/>
+    <p:sldId id="266" r:id="rId10"/>
+    <p:sldId id="260" r:id="rId11"/>
+    <p:sldId id="261" r:id="rId12"/>
+    <p:sldId id="262" r:id="rId13"/>
+    <p:sldId id="263" r:id="rId14"/>
+    <p:sldId id="335" r:id="rId15"/>
+    <p:sldId id="337" r:id="rId16"/>
+    <p:sldId id="269" r:id="rId17"/>
   </p:sldIdLst>
   <p:sldSz cx="12192000" cy="6858000"/>
   <p:notesSz cx="6858000" cy="9144000"/>
@@ -373,7 +377,7 @@
           <a:p>
             <a:fld id="{383BE459-58C4-45BC-930C-F18274598C2B}" type="datetimeFigureOut">
               <a:rPr lang="en-US" smtClean="0"/>
-              <a:t>8/24/20</a:t>
+              <a:t>8/29/20</a:t>
             </a:fld>
             <a:endParaRPr lang="en-US" dirty="0"/>
           </a:p>
@@ -729,6 +733,223 @@
 </p:notes>
 </file>
 
+<file path=ppt/notesSlides/notesSlide10.xml><?xml version="1.0" encoding="utf-8"?>
+<p:notes xmlns:a="http://schemas.openxmlformats.org/drawingml/2006/main" xmlns:r="http://schemas.openxmlformats.org/officeDocument/2006/relationships" xmlns:p="http://schemas.openxmlformats.org/presentationml/2006/main">
+  <p:cSld>
+    <p:spTree>
+      <p:nvGrpSpPr>
+        <p:cNvPr id="1" name=""/>
+        <p:cNvGrpSpPr/>
+        <p:nvPr/>
+      </p:nvGrpSpPr>
+      <p:grpSpPr>
+        <a:xfrm>
+          <a:off x="0" y="0"/>
+          <a:ext cx="0" cy="0"/>
+          <a:chOff x="0" y="0"/>
+          <a:chExt cx="0" cy="0"/>
+        </a:xfrm>
+      </p:grpSpPr>
+      <p:sp>
+        <p:nvSpPr>
+          <p:cNvPr id="2" name="Slide Image Placeholder 1"/>
+          <p:cNvSpPr>
+            <a:spLocks noGrp="1" noRot="1" noChangeAspect="1"/>
+          </p:cNvSpPr>
+          <p:nvPr>
+            <p:ph type="sldImg"/>
+          </p:nvPr>
+        </p:nvSpPr>
+        <p:spPr>
+          <a:xfrm>
+            <a:off x="685800" y="1143000"/>
+            <a:ext cx="5486400" cy="3086100"/>
+          </a:xfrm>
+        </p:spPr>
+      </p:sp>
+      <p:sp>
+        <p:nvSpPr>
+          <p:cNvPr id="3" name="Notes Placeholder 2"/>
+          <p:cNvSpPr>
+            <a:spLocks noGrp="1"/>
+          </p:cNvSpPr>
+          <p:nvPr>
+            <p:ph type="body" idx="1"/>
+          </p:nvPr>
+        </p:nvSpPr>
+        <p:spPr/>
+        <p:txBody>
+          <a:bodyPr/>
+          <a:lstStyle/>
+          <a:p>
+            <a:r>
+              <a:rPr lang="en-US" dirty="0"/>
+              <a:t>Be ready to let your T-SQL skills shine.</a:t>
+            </a:r>
+          </a:p>
+          <a:p>
+            <a:endParaRPr lang="en-US" dirty="0"/>
+          </a:p>
+          <a:p>
+            <a:r>
+              <a:rPr lang="en-US" dirty="0"/>
+              <a:t>You should</a:t>
+            </a:r>
+            <a:r>
+              <a:rPr lang="en-US" baseline="0" dirty="0"/>
+              <a:t> be able to express your skills on a computer or white board and you may need to show your design skills by looking at SQL diagrams and understanding most or all of the symbols on the diagram.</a:t>
+            </a:r>
+          </a:p>
+          <a:p>
+            <a:endParaRPr lang="en-US" baseline="0" dirty="0"/>
+          </a:p>
+          <a:p>
+            <a:r>
+              <a:rPr lang="en-US" baseline="0" dirty="0"/>
+              <a:t>DO NOT FREAK OUT.  </a:t>
+            </a:r>
+          </a:p>
+          <a:p>
+            <a:endParaRPr lang="en-US" baseline="0" dirty="0"/>
+          </a:p>
+          <a:p>
+            <a:r>
+              <a:rPr lang="en-US" baseline="0" dirty="0"/>
+              <a:t>If you need help or can’t remember something talk it through, ask for help “how would you approach this problem?” can I use google (this could be a yes or no but if you don’t ask you can’t try).  </a:t>
+            </a:r>
+          </a:p>
+          <a:p>
+            <a:endParaRPr lang="en-US" baseline="0" dirty="0"/>
+          </a:p>
+          <a:p>
+            <a:r>
+              <a:rPr lang="en-US" baseline="0" dirty="0"/>
+              <a:t>If you use google, know how to google the answer and apply the information to the example needed.  </a:t>
+            </a:r>
+            <a:endParaRPr lang="en-US" dirty="0"/>
+          </a:p>
+        </p:txBody>
+      </p:sp>
+      <p:sp>
+        <p:nvSpPr>
+          <p:cNvPr id="4" name="Slide Number Placeholder 3"/>
+          <p:cNvSpPr>
+            <a:spLocks noGrp="1"/>
+          </p:cNvSpPr>
+          <p:nvPr>
+            <p:ph type="sldNum" sz="quarter" idx="10"/>
+          </p:nvPr>
+        </p:nvSpPr>
+        <p:spPr/>
+        <p:txBody>
+          <a:bodyPr/>
+          <a:lstStyle/>
+          <a:p>
+            <a:fld id="{BB5750DE-0E3C-46B5-BC2C-5B4628307536}" type="slidenum">
+              <a:rPr lang="en-US" smtClean="0"/>
+              <a:t>12</a:t>
+            </a:fld>
+            <a:endParaRPr lang="en-US" dirty="0"/>
+          </a:p>
+        </p:txBody>
+      </p:sp>
+    </p:spTree>
+    <p:extLst>
+      <p:ext uri="{BB962C8B-B14F-4D97-AF65-F5344CB8AC3E}">
+        <p14:creationId xmlns:p14="http://schemas.microsoft.com/office/powerpoint/2010/main" val="3166339202"/>
+      </p:ext>
+    </p:extLst>
+  </p:cSld>
+  <p:clrMapOvr>
+    <a:masterClrMapping/>
+  </p:clrMapOvr>
+</p:notes>
+</file>
+
+<file path=ppt/notesSlides/notesSlide11.xml><?xml version="1.0" encoding="utf-8"?>
+<p:notes xmlns:a="http://schemas.openxmlformats.org/drawingml/2006/main" xmlns:r="http://schemas.openxmlformats.org/officeDocument/2006/relationships" xmlns:p="http://schemas.openxmlformats.org/presentationml/2006/main">
+  <p:cSld>
+    <p:spTree>
+      <p:nvGrpSpPr>
+        <p:cNvPr id="1" name=""/>
+        <p:cNvGrpSpPr/>
+        <p:nvPr/>
+      </p:nvGrpSpPr>
+      <p:grpSpPr>
+        <a:xfrm>
+          <a:off x="0" y="0"/>
+          <a:ext cx="0" cy="0"/>
+          <a:chOff x="0" y="0"/>
+          <a:chExt cx="0" cy="0"/>
+        </a:xfrm>
+      </p:grpSpPr>
+      <p:sp>
+        <p:nvSpPr>
+          <p:cNvPr id="2" name="Slide Image Placeholder 1"/>
+          <p:cNvSpPr>
+            <a:spLocks noGrp="1" noRot="1" noChangeAspect="1"/>
+          </p:cNvSpPr>
+          <p:nvPr>
+            <p:ph type="sldImg"/>
+          </p:nvPr>
+        </p:nvSpPr>
+        <p:spPr/>
+      </p:sp>
+      <p:sp>
+        <p:nvSpPr>
+          <p:cNvPr id="3" name="Notes Placeholder 2"/>
+          <p:cNvSpPr>
+            <a:spLocks noGrp="1"/>
+          </p:cNvSpPr>
+          <p:nvPr>
+            <p:ph type="body" idx="1"/>
+          </p:nvPr>
+        </p:nvSpPr>
+        <p:spPr/>
+        <p:txBody>
+          <a:bodyPr/>
+          <a:lstStyle/>
+          <a:p>
+            <a:endParaRPr lang="en-US" dirty="0"/>
+          </a:p>
+        </p:txBody>
+      </p:sp>
+      <p:sp>
+        <p:nvSpPr>
+          <p:cNvPr id="4" name="Slide Number Placeholder 3"/>
+          <p:cNvSpPr>
+            <a:spLocks noGrp="1"/>
+          </p:cNvSpPr>
+          <p:nvPr>
+            <p:ph type="sldNum" sz="quarter" idx="5"/>
+          </p:nvPr>
+        </p:nvSpPr>
+        <p:spPr/>
+        <p:txBody>
+          <a:bodyPr/>
+          <a:lstStyle/>
+          <a:p>
+            <a:fld id="{BB5750DE-0E3C-46B5-BC2C-5B4628307536}" type="slidenum">
+              <a:rPr lang="en-US" smtClean="0"/>
+              <a:t>14</a:t>
+            </a:fld>
+            <a:endParaRPr lang="en-US" dirty="0"/>
+          </a:p>
+        </p:txBody>
+      </p:sp>
+    </p:spTree>
+    <p:extLst>
+      <p:ext uri="{BB962C8B-B14F-4D97-AF65-F5344CB8AC3E}">
+        <p14:creationId xmlns:p14="http://schemas.microsoft.com/office/powerpoint/2010/main" val="2534068598"/>
+      </p:ext>
+    </p:extLst>
+  </p:cSld>
+  <p:clrMapOvr>
+    <a:masterClrMapping/>
+  </p:clrMapOvr>
+</p:notes>
+</file>
+
 <file path=ppt/notesSlides/notesSlide2.xml><?xml version="1.0" encoding="utf-8"?>
 <p:notes xmlns:a="http://schemas.openxmlformats.org/drawingml/2006/main" xmlns:r="http://schemas.openxmlformats.org/officeDocument/2006/relationships" xmlns:p="http://schemas.openxmlformats.org/presentationml/2006/main">
   <p:cSld>
@@ -799,7 +1020,7 @@
           <a:p>
             <a:fld id="{BB5750DE-0E3C-46B5-BC2C-5B4628307536}" type="slidenum">
               <a:rPr lang="en-US" smtClean="0"/>
-              <a:t>2</a:t>
+              <a:t>4</a:t>
             </a:fld>
             <a:endParaRPr lang="en-US" dirty="0"/>
           </a:p>
@@ -845,12 +1066,7 @@
             <p:ph type="sldImg"/>
           </p:nvPr>
         </p:nvSpPr>
-        <p:spPr>
-          <a:xfrm>
-            <a:off x="685800" y="1143000"/>
-            <a:ext cx="5486400" cy="3086100"/>
-          </a:xfrm>
-        </p:spPr>
+        <p:spPr/>
       </p:sp>
       <p:sp>
         <p:nvSpPr>
@@ -869,68 +1085,8 @@
           <a:p>
             <a:r>
               <a:rPr lang="en-US" dirty="0"/>
-              <a:t>“Every</a:t>
-            </a:r>
-            <a:r>
-              <a:rPr lang="en-US" baseline="0" dirty="0"/>
-              <a:t>thing ends badly or it wouldn’t end!” While this may not be the case with every place it at least is a good place to start.</a:t>
-            </a:r>
-          </a:p>
-          <a:p>
-            <a:endParaRPr lang="en-US" baseline="0" dirty="0"/>
-          </a:p>
-          <a:p>
-            <a:pPr marL="171450" indent="-171450">
-              <a:buFont typeface="Arial" panose="020B0604020202020204" pitchFamily="34" charset="0"/>
-              <a:buChar char="•"/>
-            </a:pPr>
-            <a:r>
-              <a:rPr lang="en-US" baseline="0" dirty="0"/>
-              <a:t>Sometimes its easier to just walk away, or we tell ourselves this is the case.  If you are leaving due to a sexual harassment issue, you should fight this before leaving.  You are worth too much to let this be the reason for change.  And if it happens to you it may be happening to someone else.</a:t>
-            </a:r>
-          </a:p>
-          <a:p>
-            <a:pPr marL="171450" indent="-171450">
-              <a:buFont typeface="Arial" panose="020B0604020202020204" pitchFamily="34" charset="0"/>
-              <a:buChar char="•"/>
-            </a:pPr>
-            <a:endParaRPr lang="en-US" baseline="0" dirty="0"/>
-          </a:p>
-          <a:p>
-            <a:pPr marL="0" marR="0" lvl="0" indent="0" algn="l" defTabSz="914400" rtl="0" eaLnBrk="1" fontAlgn="auto" latinLnBrk="0" hangingPunct="1">
-              <a:lnSpc>
-                <a:spcPct val="100000"/>
-              </a:lnSpc>
-              <a:spcBef>
-                <a:spcPts val="0"/>
-              </a:spcBef>
-              <a:spcAft>
-                <a:spcPts val="0"/>
-              </a:spcAft>
-              <a:buClrTx/>
-              <a:buSzTx/>
-              <a:buFont typeface="Arial" panose="020B0604020202020204" pitchFamily="34" charset="0"/>
-              <a:buNone/>
-              <a:tabLst/>
-              <a:defRPr/>
-            </a:pPr>
-            <a:r>
-              <a:rPr lang="en-US" dirty="0"/>
-              <a:t>Are you running away from something or running to something?</a:t>
-            </a:r>
-            <a:endParaRPr lang="en-US" baseline="0" dirty="0"/>
-          </a:p>
-          <a:p>
-            <a:endParaRPr lang="en-US" baseline="0" dirty="0"/>
-          </a:p>
-          <a:p>
-            <a:r>
-              <a:rPr lang="en-US" baseline="0" dirty="0"/>
-              <a:t>How loyal are you verses how loyal is your company to you?</a:t>
-            </a:r>
-          </a:p>
-          <a:p>
-            <a:endParaRPr lang="en-US" dirty="0"/>
+              <a:t>Don’t tweet me, I don’t look at it except at PASS.</a:t>
+            </a:r>
           </a:p>
         </p:txBody>
       </p:sp>
@@ -941,7 +1097,7 @@
             <a:spLocks noGrp="1"/>
           </p:cNvSpPr>
           <p:nvPr>
-            <p:ph type="sldNum" sz="quarter" idx="10"/>
+            <p:ph type="sldNum" sz="quarter" idx="5"/>
           </p:nvPr>
         </p:nvSpPr>
         <p:spPr/>
@@ -951,7 +1107,7 @@
           <a:p>
             <a:fld id="{BB5750DE-0E3C-46B5-BC2C-5B4628307536}" type="slidenum">
               <a:rPr lang="en-US" smtClean="0"/>
-              <a:t>4</a:t>
+              <a:t>5</a:t>
             </a:fld>
             <a:endParaRPr lang="en-US" dirty="0"/>
           </a:p>
@@ -960,7 +1116,7 @@
     </p:spTree>
     <p:extLst>
       <p:ext uri="{BB962C8B-B14F-4D97-AF65-F5344CB8AC3E}">
-        <p14:creationId xmlns:p14="http://schemas.microsoft.com/office/powerpoint/2010/main" val="2435159539"/>
+        <p14:creationId xmlns:p14="http://schemas.microsoft.com/office/powerpoint/2010/main" val="3602407059"/>
       </p:ext>
     </p:extLst>
   </p:cSld>
@@ -1021,95 +1177,68 @@
           <a:p>
             <a:r>
               <a:rPr lang="en-US" dirty="0"/>
-              <a:t>Your resume needs to be updated before you apply,</a:t>
+              <a:t>“Every</a:t>
             </a:r>
             <a:r>
               <a:rPr lang="en-US" baseline="0" dirty="0"/>
-              <a:t> this sounds really obvious but just make sure you update it first</a:t>
-            </a:r>
-            <a:r>
-              <a:rPr lang="en-US" dirty="0"/>
-              <a:t>. </a:t>
-            </a:r>
-          </a:p>
-          <a:p>
-            <a:endParaRPr lang="en-US" dirty="0"/>
-          </a:p>
-          <a:p>
-            <a:r>
-              <a:rPr lang="en-US" dirty="0"/>
-              <a:t>It should be professional and</a:t>
-            </a:r>
+              <a:t>thing ends badly or it wouldn’t end!” While this may not be the case with every place it at least is a good place to start.</a:t>
+            </a:r>
+          </a:p>
+          <a:p>
+            <a:endParaRPr lang="en-US" baseline="0" dirty="0"/>
+          </a:p>
+          <a:p>
+            <a:pPr marL="171450" indent="-171450">
+              <a:buFont typeface="Arial" panose="020B0604020202020204" pitchFamily="34" charset="0"/>
+              <a:buChar char="•"/>
+            </a:pPr>
             <a:r>
               <a:rPr lang="en-US" baseline="0" dirty="0"/>
-              <a:t> to the point with the minimal amount of information that proves you know what you are doing and make you look enticing. One page preferred, but no longer then two pages. If you are applying out of state/town and are willing to relocate (on your own, or company specified) put that on your resume, don’t make people guess. Don’t put your resume in a random format.</a:t>
-            </a:r>
-          </a:p>
-          <a:p>
+              <a:t>Sometimes its easier to just walk away, or we tell ourselves this is the case.  If you are leaving due to a sexual harassment issue, you should fight this before leaving.  You are worth too much to let this be the reason for change.  And if it happens to you it may be happening to someone else.</a:t>
+            </a:r>
+          </a:p>
+          <a:p>
+            <a:pPr marL="171450" indent="-171450">
+              <a:buFont typeface="Arial" panose="020B0604020202020204" pitchFamily="34" charset="0"/>
+              <a:buChar char="•"/>
+            </a:pPr>
             <a:endParaRPr lang="en-US" baseline="0" dirty="0"/>
           </a:p>
           <a:p>
+            <a:pPr marL="0" marR="0" lvl="0" indent="0" algn="l" defTabSz="914400" rtl="0" eaLnBrk="1" fontAlgn="auto" latinLnBrk="0" hangingPunct="1">
+              <a:lnSpc>
+                <a:spcPct val="100000"/>
+              </a:lnSpc>
+              <a:spcBef>
+                <a:spcPts val="0"/>
+              </a:spcBef>
+              <a:spcAft>
+                <a:spcPts val="0"/>
+              </a:spcAft>
+              <a:buClrTx/>
+              <a:buSzTx/>
+              <a:buFont typeface="Arial" panose="020B0604020202020204" pitchFamily="34" charset="0"/>
+              <a:buNone/>
+              <a:tabLst/>
+              <a:defRPr/>
+            </a:pPr>
+            <a:r>
+              <a:rPr lang="en-US" dirty="0"/>
+              <a:t>Are you running away from something or running to something?</a:t>
+            </a:r>
+            <a:endParaRPr lang="en-US" baseline="0" dirty="0"/>
+          </a:p>
+          <a:p>
+            <a:endParaRPr lang="en-US" baseline="0" dirty="0"/>
+          </a:p>
+          <a:p>
             <a:r>
               <a:rPr lang="en-US" baseline="0" dirty="0"/>
-              <a:t>Make sure your contact information is up-to-date on your resume! </a:t>
-            </a:r>
-          </a:p>
-          <a:p>
-            <a:endParaRPr lang="en-US" baseline="0" dirty="0"/>
-          </a:p>
-          <a:p>
-            <a:r>
-              <a:rPr lang="en-US" baseline="0" dirty="0"/>
-              <a:t>If you have short employment times be willing to “justify” those times and make sure you are upfront about it, don’t try and hide these details from any of the interviewers. </a:t>
-            </a:r>
-          </a:p>
-          <a:p>
-            <a:endParaRPr lang="en-US" baseline="0" dirty="0"/>
-          </a:p>
-          <a:p>
-            <a:r>
-              <a:rPr lang="en-US" baseline="0" dirty="0"/>
-              <a:t>When you apply add a cover letter (these are not ignored and might be what is needed to get in the door).  If the job listing is “Playful” have fun with the cover letter, if it’s serious follow suit.</a:t>
-            </a:r>
-          </a:p>
-          <a:p>
-            <a:endParaRPr lang="en-US" baseline="0" dirty="0"/>
-          </a:p>
-          <a:p>
-            <a:r>
-              <a:rPr lang="en-US" baseline="0" dirty="0"/>
-              <a:t>Review the requirements, if you are close apply, if you are way off and you really want to see how you might fit in, it’s not a bad idea to apply. A lot of places keep track of resume’s and applicants so they can reach out later for a better fitting job or opportunity that may be available in the future.</a:t>
-            </a:r>
-          </a:p>
-          <a:p>
-            <a:endParaRPr lang="en-US" baseline="0" dirty="0"/>
-          </a:p>
-          <a:p>
-            <a:r>
-              <a:rPr lang="en-US" baseline="0" dirty="0"/>
-              <a:t>You should be automating all your DBA tasks in PowerShell, this allows you to be able to interact with objects, this is critical to your future in database programing. </a:t>
-            </a:r>
-          </a:p>
-          <a:p>
-            <a:endParaRPr lang="en-US" baseline="0" dirty="0"/>
-          </a:p>
-          <a:p>
-            <a:r>
-              <a:rPr lang="en-US" baseline="0" dirty="0"/>
-              <a:t>Your code should be in a GIT repository, this is a challenge for database people we don’t need to use it for your scripts.</a:t>
-            </a:r>
-          </a:p>
-          <a:p>
-            <a:endParaRPr lang="en-US" baseline="0" dirty="0"/>
-          </a:p>
-          <a:p>
-            <a:r>
-              <a:rPr lang="en-US" baseline="0" dirty="0"/>
-              <a:t>You should start to understand different cloud providers and how they work with data. There is a big gap between on prem and cloud, you should close your understanding of that gap.</a:t>
-            </a:r>
-          </a:p>
-          <a:p>
-            <a:endParaRPr lang="en-US" baseline="0" dirty="0"/>
+              <a:t>How loyal are you verses how loyal is your company to you?</a:t>
+            </a:r>
+          </a:p>
+          <a:p>
+            <a:endParaRPr lang="en-US" dirty="0"/>
           </a:p>
         </p:txBody>
       </p:sp>
@@ -1130,7 +1259,7 @@
           <a:p>
             <a:fld id="{BB5750DE-0E3C-46B5-BC2C-5B4628307536}" type="slidenum">
               <a:rPr lang="en-US" smtClean="0"/>
-              <a:t>5</a:t>
+              <a:t>6</a:t>
             </a:fld>
             <a:endParaRPr lang="en-US" dirty="0"/>
           </a:p>
@@ -1139,7 +1268,7 @@
     </p:spTree>
     <p:extLst>
       <p:ext uri="{BB962C8B-B14F-4D97-AF65-F5344CB8AC3E}">
-        <p14:creationId xmlns:p14="http://schemas.microsoft.com/office/powerpoint/2010/main" val="81599409"/>
+        <p14:creationId xmlns:p14="http://schemas.microsoft.com/office/powerpoint/2010/main" val="2435159539"/>
       </p:ext>
     </p:extLst>
   </p:cSld>
@@ -1200,72 +1329,95 @@
           <a:p>
             <a:r>
               <a:rPr lang="en-US" dirty="0"/>
-              <a:t>There is usually company rhetoric</a:t>
+              <a:t>Your resume needs to be updated before you apply,</a:t>
             </a:r>
             <a:r>
               <a:rPr lang="en-US" baseline="0" dirty="0"/>
-              <a:t>, We are the best…, We have the best…, Look how great we are.</a:t>
-            </a:r>
-          </a:p>
-          <a:p>
+              <a:t> this sounds really obvious but just make sure you update it first</a:t>
+            </a:r>
+            <a:r>
+              <a:rPr lang="en-US" dirty="0"/>
+              <a:t>. </a:t>
+            </a:r>
+          </a:p>
+          <a:p>
+            <a:endParaRPr lang="en-US" dirty="0"/>
+          </a:p>
+          <a:p>
+            <a:r>
+              <a:rPr lang="en-US" dirty="0"/>
+              <a:t>It should be professional and</a:t>
+            </a:r>
             <a:r>
               <a:rPr lang="en-US" baseline="0" dirty="0"/>
-              <a:t>Asking question is a good way for you to see what the team or manager is like. If they are very smug or vague about the answers maybe you don’t want to work here.</a:t>
-            </a:r>
-          </a:p>
-          <a:p>
-            <a:r>
-              <a:rPr lang="en-US" dirty="0"/>
-              <a:t>Basically</a:t>
-            </a:r>
+              <a:t> to the point with the minimal amount of information that proves you know what you are doing and make you look enticing. One page preferred, but no longer then two pages. If you are applying out of state/town and are willing to relocate (on your own, or company specified) put that on your resume, don’t make people guess. Don’t put your resume in a random format.</a:t>
+            </a:r>
+          </a:p>
+          <a:p>
+            <a:endParaRPr lang="en-US" baseline="0" dirty="0"/>
+          </a:p>
+          <a:p>
             <a:r>
               <a:rPr lang="en-US" baseline="0" dirty="0"/>
-              <a:t> you want to stock the company like a teenager, find out employee reviews good and bad.</a:t>
-            </a:r>
-          </a:p>
-          <a:p>
-            <a:pPr marL="171450" indent="-171450">
-              <a:buFont typeface="Arial" panose="020B0604020202020204" pitchFamily="34" charset="0"/>
-              <a:buChar char="•"/>
-            </a:pPr>
+              <a:t>Make sure your contact information is up-to-date on your resume! </a:t>
+            </a:r>
+          </a:p>
+          <a:p>
+            <a:endParaRPr lang="en-US" baseline="0" dirty="0"/>
+          </a:p>
+          <a:p>
             <a:r>
               <a:rPr lang="en-US" baseline="0" dirty="0"/>
-              <a:t>Linkedin (people)</a:t>
-            </a:r>
-          </a:p>
-          <a:p>
-            <a:pPr marL="171450" indent="-171450">
-              <a:buFont typeface="Arial" panose="020B0604020202020204" pitchFamily="34" charset="0"/>
-              <a:buChar char="•"/>
-            </a:pPr>
+              <a:t>If you have short employment times be willing to “justify” those times and make sure you are upfront about it, don’t try and hide these details from any of the interviewers. </a:t>
+            </a:r>
+          </a:p>
+          <a:p>
+            <a:endParaRPr lang="en-US" baseline="0" dirty="0"/>
+          </a:p>
+          <a:p>
             <a:r>
               <a:rPr lang="en-US" baseline="0" dirty="0"/>
-              <a:t>Facebook (company)</a:t>
-            </a:r>
-          </a:p>
-          <a:p>
-            <a:pPr marL="171450" indent="-171450">
-              <a:buFont typeface="Arial" panose="020B0604020202020204" pitchFamily="34" charset="0"/>
-              <a:buChar char="•"/>
-            </a:pPr>
+              <a:t>When you apply add a cover letter (these are not ignored and might be what is needed to get in the door).  If the job listing is “Playful” have fun with the cover letter, if it’s serious follow suit.</a:t>
+            </a:r>
+          </a:p>
+          <a:p>
+            <a:endParaRPr lang="en-US" baseline="0" dirty="0"/>
+          </a:p>
+          <a:p>
             <a:r>
               <a:rPr lang="en-US" baseline="0" dirty="0"/>
-              <a:t>Twitter</a:t>
-            </a:r>
-          </a:p>
-          <a:p>
-            <a:pPr marL="171450" indent="-171450">
-              <a:buFont typeface="Arial" panose="020B0604020202020204" pitchFamily="34" charset="0"/>
-              <a:buChar char="•"/>
-            </a:pPr>
+              <a:t>Review the requirements, if you are close apply, if you are way off and you really want to see how you might fit in, it’s not a bad idea to apply. A lot of places keep track of resume’s and applicants so they can reach out later for a better fitting job or opportunity that may be available in the future.</a:t>
+            </a:r>
+          </a:p>
+          <a:p>
             <a:endParaRPr lang="en-US" baseline="0" dirty="0"/>
           </a:p>
           <a:p>
-            <a:pPr marL="0" indent="0">
-              <a:buFont typeface="Arial" panose="020B0604020202020204" pitchFamily="34" charset="0"/>
-              <a:buNone/>
-            </a:pPr>
-            <a:endParaRPr lang="en-US" dirty="0"/>
+            <a:r>
+              <a:rPr lang="en-US" baseline="0" dirty="0"/>
+              <a:t>You should be automating all your DBA tasks in PowerShell, this allows you to be able to interact with objects, this is critical to your future in database programing. </a:t>
+            </a:r>
+          </a:p>
+          <a:p>
+            <a:endParaRPr lang="en-US" baseline="0" dirty="0"/>
+          </a:p>
+          <a:p>
+            <a:r>
+              <a:rPr lang="en-US" baseline="0" dirty="0"/>
+              <a:t>Your code should be in a GIT repository, this is a challenge for database people we don’t need to use it for your scripts.</a:t>
+            </a:r>
+          </a:p>
+          <a:p>
+            <a:endParaRPr lang="en-US" baseline="0" dirty="0"/>
+          </a:p>
+          <a:p>
+            <a:r>
+              <a:rPr lang="en-US" baseline="0" dirty="0"/>
+              <a:t>You should start to understand different cloud providers and how they work with data. There is a big gap between on prem and cloud, you should close your understanding of that gap.</a:t>
+            </a:r>
+          </a:p>
+          <a:p>
+            <a:endParaRPr lang="en-US" baseline="0" dirty="0"/>
           </a:p>
         </p:txBody>
       </p:sp>
@@ -1286,7 +1438,7 @@
           <a:p>
             <a:fld id="{BB5750DE-0E3C-46B5-BC2C-5B4628307536}" type="slidenum">
               <a:rPr lang="en-US" smtClean="0"/>
-              <a:t>6</a:t>
+              <a:t>7</a:t>
             </a:fld>
             <a:endParaRPr lang="en-US" dirty="0"/>
           </a:p>
@@ -1295,7 +1447,7 @@
     </p:spTree>
     <p:extLst>
       <p:ext uri="{BB962C8B-B14F-4D97-AF65-F5344CB8AC3E}">
-        <p14:creationId xmlns:p14="http://schemas.microsoft.com/office/powerpoint/2010/main" val="2975989376"/>
+        <p14:creationId xmlns:p14="http://schemas.microsoft.com/office/powerpoint/2010/main" val="81599409"/>
       </p:ext>
     </p:extLst>
   </p:cSld>
@@ -1354,6 +1506,73 @@
           <a:bodyPr/>
           <a:lstStyle/>
           <a:p>
+            <a:r>
+              <a:rPr lang="en-US" dirty="0"/>
+              <a:t>There is usually company rhetoric</a:t>
+            </a:r>
+            <a:r>
+              <a:rPr lang="en-US" baseline="0" dirty="0"/>
+              <a:t>, We are the best…, We have the best…, Look how great we are.</a:t>
+            </a:r>
+          </a:p>
+          <a:p>
+            <a:r>
+              <a:rPr lang="en-US" baseline="0" dirty="0"/>
+              <a:t>Asking question is a good way for you to see what the team or manager is like. If they are very smug or vague about the answers maybe you don’t want to work here.</a:t>
+            </a:r>
+          </a:p>
+          <a:p>
+            <a:r>
+              <a:rPr lang="en-US" dirty="0"/>
+              <a:t>Basically</a:t>
+            </a:r>
+            <a:r>
+              <a:rPr lang="en-US" baseline="0" dirty="0"/>
+              <a:t> you want to stock the company like a teenager, find out employee reviews good and bad.</a:t>
+            </a:r>
+          </a:p>
+          <a:p>
+            <a:pPr marL="171450" indent="-171450">
+              <a:buFont typeface="Arial" panose="020B0604020202020204" pitchFamily="34" charset="0"/>
+              <a:buChar char="•"/>
+            </a:pPr>
+            <a:r>
+              <a:rPr lang="en-US" baseline="0" dirty="0"/>
+              <a:t>Linkedin (people)</a:t>
+            </a:r>
+          </a:p>
+          <a:p>
+            <a:pPr marL="171450" indent="-171450">
+              <a:buFont typeface="Arial" panose="020B0604020202020204" pitchFamily="34" charset="0"/>
+              <a:buChar char="•"/>
+            </a:pPr>
+            <a:r>
+              <a:rPr lang="en-US" baseline="0" dirty="0"/>
+              <a:t>Facebook (company)</a:t>
+            </a:r>
+          </a:p>
+          <a:p>
+            <a:pPr marL="171450" indent="-171450">
+              <a:buFont typeface="Arial" panose="020B0604020202020204" pitchFamily="34" charset="0"/>
+              <a:buChar char="•"/>
+            </a:pPr>
+            <a:r>
+              <a:rPr lang="en-US" baseline="0" dirty="0"/>
+              <a:t>Twitter</a:t>
+            </a:r>
+          </a:p>
+          <a:p>
+            <a:pPr marL="171450" indent="-171450">
+              <a:buFont typeface="Arial" panose="020B0604020202020204" pitchFamily="34" charset="0"/>
+              <a:buChar char="•"/>
+            </a:pPr>
+            <a:endParaRPr lang="en-US" baseline="0" dirty="0"/>
+          </a:p>
+          <a:p>
+            <a:pPr marL="0" indent="0">
+              <a:buFont typeface="Arial" panose="020B0604020202020204" pitchFamily="34" charset="0"/>
+              <a:buNone/>
+            </a:pPr>
             <a:endParaRPr lang="en-US" dirty="0"/>
           </a:p>
         </p:txBody>
@@ -1365,7 +1584,7 @@
             <a:spLocks noGrp="1"/>
           </p:cNvSpPr>
           <p:nvPr>
-            <p:ph type="sldNum" sz="quarter" idx="5"/>
+            <p:ph type="sldNum" sz="quarter" idx="10"/>
           </p:nvPr>
         </p:nvSpPr>
         <p:spPr/>
@@ -1375,7 +1594,7 @@
           <a:p>
             <a:fld id="{BB5750DE-0E3C-46B5-BC2C-5B4628307536}" type="slidenum">
               <a:rPr lang="en-US" smtClean="0"/>
-              <a:t>7</a:t>
+              <a:t>8</a:t>
             </a:fld>
             <a:endParaRPr lang="en-US" dirty="0"/>
           </a:p>
@@ -1384,7 +1603,7 @@
     </p:spTree>
     <p:extLst>
       <p:ext uri="{BB962C8B-B14F-4D97-AF65-F5344CB8AC3E}">
-        <p14:creationId xmlns:p14="http://schemas.microsoft.com/office/powerpoint/2010/main" val="1559014462"/>
+        <p14:creationId xmlns:p14="http://schemas.microsoft.com/office/powerpoint/2010/main" val="2975989376"/>
       </p:ext>
     </p:extLst>
   </p:cSld>
@@ -1443,14 +1662,6 @@
           <a:bodyPr/>
           <a:lstStyle/>
           <a:p>
-            <a:r>
-              <a:rPr lang="en-US" dirty="0"/>
-              <a:t>This is the interview they “feel you out” to see if you want too much money, or if you are really seriously</a:t>
-            </a:r>
-            <a:r>
-              <a:rPr lang="en-US" baseline="0" dirty="0"/>
-              <a:t> looking.  The person doing the interview is most likely not an IT person so try to avoid jargon.</a:t>
-            </a:r>
             <a:endParaRPr lang="en-US" dirty="0"/>
           </a:p>
         </p:txBody>
@@ -1462,7 +1673,7 @@
             <a:spLocks noGrp="1"/>
           </p:cNvSpPr>
           <p:nvPr>
-            <p:ph type="sldNum" sz="quarter" idx="10"/>
+            <p:ph type="sldNum" sz="quarter" idx="5"/>
           </p:nvPr>
         </p:nvSpPr>
         <p:spPr/>
@@ -1472,7 +1683,7 @@
           <a:p>
             <a:fld id="{BB5750DE-0E3C-46B5-BC2C-5B4628307536}" type="slidenum">
               <a:rPr lang="en-US" smtClean="0"/>
-              <a:t>8</a:t>
+              <a:t>9</a:t>
             </a:fld>
             <a:endParaRPr lang="en-US" dirty="0"/>
           </a:p>
@@ -1481,7 +1692,7 @@
     </p:spTree>
     <p:extLst>
       <p:ext uri="{BB962C8B-B14F-4D97-AF65-F5344CB8AC3E}">
-        <p14:creationId xmlns:p14="http://schemas.microsoft.com/office/powerpoint/2010/main" val="479397346"/>
+        <p14:creationId xmlns:p14="http://schemas.microsoft.com/office/powerpoint/2010/main" val="1559014462"/>
       </p:ext>
     </p:extLst>
   </p:cSld>
@@ -1542,31 +1753,12 @@
           <a:p>
             <a:r>
               <a:rPr lang="en-US" dirty="0"/>
-              <a:t>Calm down.</a:t>
-            </a:r>
-          </a:p>
-          <a:p>
-            <a:endParaRPr lang="en-US" dirty="0"/>
-          </a:p>
-          <a:p>
-            <a:r>
-              <a:rPr lang="en-US" dirty="0"/>
-              <a:t>If you don’t know</a:t>
+              <a:t>This is the interview they “feel you out” to see if you want too much money, or if you are really seriously</a:t>
             </a:r>
             <a:r>
               <a:rPr lang="en-US" baseline="0" dirty="0"/>
-              <a:t> </a:t>
-            </a:r>
-            <a:r>
-              <a:rPr lang="en-US" dirty="0"/>
-              <a:t>something,</a:t>
-            </a:r>
-            <a:r>
-              <a:rPr lang="en-US" baseline="0" dirty="0"/>
-              <a:t> you can say “I think…” or “Is it like…” but don’t try and guess or make up an answer. The people on the other side of the table want to find out how you are going to fit into their environment, if you are guessing or making stuff up will they trust you? </a:t>
-            </a:r>
-          </a:p>
-          <a:p>
+              <a:t> looking.  The person doing the interview is most likely not an IT person so try to avoid jargon.</a:t>
+            </a:r>
             <a:endParaRPr lang="en-US" dirty="0"/>
           </a:p>
         </p:txBody>
@@ -1588,7 +1780,7 @@
           <a:p>
             <a:fld id="{BB5750DE-0E3C-46B5-BC2C-5B4628307536}" type="slidenum">
               <a:rPr lang="en-US" smtClean="0"/>
-              <a:t>9</a:t>
+              <a:t>10</a:t>
             </a:fld>
             <a:endParaRPr lang="en-US" dirty="0"/>
           </a:p>
@@ -1597,7 +1789,7 @@
     </p:spTree>
     <p:extLst>
       <p:ext uri="{BB962C8B-B14F-4D97-AF65-F5344CB8AC3E}">
-        <p14:creationId xmlns:p14="http://schemas.microsoft.com/office/powerpoint/2010/main" val="1411006164"/>
+        <p14:creationId xmlns:p14="http://schemas.microsoft.com/office/powerpoint/2010/main" val="479397346"/>
       </p:ext>
     </p:extLst>
   </p:cSld>
@@ -1658,48 +1850,31 @@
           <a:p>
             <a:r>
               <a:rPr lang="en-US" dirty="0"/>
-              <a:t>Be ready to let your T-SQL skills shine.</a:t>
-            </a:r>
-          </a:p>
-          <a:p>
-            <a:endParaRPr lang="en-US" dirty="0"/>
-          </a:p>
-          <a:p>
-            <a:r>
-              <a:rPr lang="en-US" dirty="0"/>
-              <a:t>You should</a:t>
+              <a:t>Calm down.</a:t>
+            </a:r>
+          </a:p>
+          <a:p>
+            <a:endParaRPr lang="en-US" dirty="0"/>
+          </a:p>
+          <a:p>
+            <a:r>
+              <a:rPr lang="en-US" dirty="0"/>
+              <a:t>If you don’t know</a:t>
             </a:r>
             <a:r>
               <a:rPr lang="en-US" baseline="0" dirty="0"/>
-              <a:t> be able to express your skills on a computer or white board and you may need to show your design skills by looking at SQL diagrams and understanding most or all of the symbols on the diagram.</a:t>
-            </a:r>
-          </a:p>
-          <a:p>
-            <a:endParaRPr lang="en-US" baseline="0" dirty="0"/>
-          </a:p>
-          <a:p>
+              <a:t> </a:t>
+            </a:r>
+            <a:r>
+              <a:rPr lang="en-US" dirty="0"/>
+              <a:t>something,</a:t>
+            </a:r>
             <a:r>
               <a:rPr lang="en-US" baseline="0" dirty="0"/>
-              <a:t>DO NOT FREAK OUT.  </a:t>
-            </a:r>
-          </a:p>
-          <a:p>
-            <a:endParaRPr lang="en-US" baseline="0" dirty="0"/>
-          </a:p>
-          <a:p>
-            <a:r>
-              <a:rPr lang="en-US" baseline="0" dirty="0"/>
-              <a:t>If you need help or can’t remember something talk it through, ask for help “how would you approach this problem?” can I use google (this could be a yes or no but if you don’t ask you can’t try).  </a:t>
-            </a:r>
-          </a:p>
-          <a:p>
-            <a:endParaRPr lang="en-US" baseline="0" dirty="0"/>
-          </a:p>
-          <a:p>
-            <a:r>
-              <a:rPr lang="en-US" baseline="0" dirty="0"/>
-              <a:t>If you use google, know how to google the answer and apply the information to the example needed.  </a:t>
-            </a:r>
+              <a:t> you can say “I think…” or “Is it like…” but don’t try and guess or make up an answer. The people on the other side of the table want to find out how you are going to fit into their environment, if you are guessing or making stuff up will they trust you? </a:t>
+            </a:r>
+          </a:p>
+          <a:p>
             <a:endParaRPr lang="en-US" dirty="0"/>
           </a:p>
         </p:txBody>
@@ -1721,7 +1896,7 @@
           <a:p>
             <a:fld id="{BB5750DE-0E3C-46B5-BC2C-5B4628307536}" type="slidenum">
               <a:rPr lang="en-US" smtClean="0"/>
-              <a:t>10</a:t>
+              <a:t>11</a:t>
             </a:fld>
             <a:endParaRPr lang="en-US" dirty="0"/>
           </a:p>
@@ -1730,7 +1905,7 @@
     </p:spTree>
     <p:extLst>
       <p:ext uri="{BB962C8B-B14F-4D97-AF65-F5344CB8AC3E}">
-        <p14:creationId xmlns:p14="http://schemas.microsoft.com/office/powerpoint/2010/main" val="3166339202"/>
+        <p14:creationId xmlns:p14="http://schemas.microsoft.com/office/powerpoint/2010/main" val="1411006164"/>
       </p:ext>
     </p:extLst>
   </p:cSld>
@@ -1910,7 +2085,7 @@
           <a:p>
             <a:fld id="{48A87A34-81AB-432B-8DAE-1953F412C126}" type="datetimeFigureOut">
               <a:rPr lang="en-US" dirty="0"/>
-              <a:t>8/24/20</a:t>
+              <a:t>8/29/20</a:t>
             </a:fld>
             <a:endParaRPr lang="en-US" dirty="0"/>
           </a:p>
@@ -2171,7 +2346,7 @@
           <a:p>
             <a:fld id="{48A87A34-81AB-432B-8DAE-1953F412C126}" type="datetimeFigureOut">
               <a:rPr lang="en-US" dirty="0"/>
-              <a:t>8/24/20</a:t>
+              <a:t>8/29/20</a:t>
             </a:fld>
             <a:endParaRPr lang="en-US" dirty="0"/>
           </a:p>
@@ -2398,7 +2573,7 @@
             <a:fld id="{48A87A34-81AB-432B-8DAE-1953F412C126}" type="datetimeFigureOut">
               <a:rPr lang="en-US" dirty="0"/>
               <a:pPr/>
-              <a:t>8/24/20</a:t>
+              <a:t>8/29/20</a:t>
             </a:fld>
             <a:endParaRPr lang="en-US" dirty="0"/>
           </a:p>
@@ -2704,7 +2879,7 @@
             <a:fld id="{48A87A34-81AB-432B-8DAE-1953F412C126}" type="datetimeFigureOut">
               <a:rPr lang="en-US" dirty="0"/>
               <a:pPr/>
-              <a:t>8/24/20</a:t>
+              <a:t>8/29/20</a:t>
             </a:fld>
             <a:endParaRPr lang="en-US" dirty="0"/>
           </a:p>
@@ -3173,7 +3348,7 @@
             <a:fld id="{48A87A34-81AB-432B-8DAE-1953F412C126}" type="datetimeFigureOut">
               <a:rPr lang="en-US" dirty="0"/>
               <a:pPr/>
-              <a:t>8/24/20</a:t>
+              <a:t>8/29/20</a:t>
             </a:fld>
             <a:endParaRPr lang="en-US" dirty="0"/>
           </a:p>
@@ -3715,7 +3890,7 @@
           <a:p>
             <a:fld id="{48A87A34-81AB-432B-8DAE-1953F412C126}" type="datetimeFigureOut">
               <a:rPr lang="en-US" dirty="0"/>
-              <a:t>8/24/20</a:t>
+              <a:t>8/29/20</a:t>
             </a:fld>
             <a:endParaRPr lang="en-US" dirty="0"/>
           </a:p>
@@ -4481,7 +4656,7 @@
           <a:p>
             <a:fld id="{48A87A34-81AB-432B-8DAE-1953F412C126}" type="datetimeFigureOut">
               <a:rPr lang="en-US" dirty="0"/>
-              <a:t>8/24/20</a:t>
+              <a:t>8/29/20</a:t>
             </a:fld>
             <a:endParaRPr lang="en-US" dirty="0"/>
           </a:p>
@@ -4651,7 +4826,7 @@
           <a:p>
             <a:fld id="{48A87A34-81AB-432B-8DAE-1953F412C126}" type="datetimeFigureOut">
               <a:rPr lang="en-US" dirty="0"/>
-              <a:t>8/24/20</a:t>
+              <a:t>8/29/20</a:t>
             </a:fld>
             <a:endParaRPr lang="en-US" dirty="0"/>
           </a:p>
@@ -4870,7 +5045,7 @@
             <a:fld id="{48A87A34-81AB-432B-8DAE-1953F412C126}" type="datetimeFigureOut">
               <a:rPr lang="en-US" dirty="0"/>
               <a:pPr/>
-              <a:t>8/24/20</a:t>
+              <a:t>8/29/20</a:t>
             </a:fld>
             <a:endParaRPr lang="en-US" dirty="0"/>
           </a:p>
@@ -4929,6 +5104,436 @@
         </p:txBody>
       </p:sp>
     </p:spTree>
+  </p:cSld>
+  <p:clrMapOvr>
+    <a:masterClrMapping/>
+  </p:clrMapOvr>
+</p:sldLayout>
+</file>
+
+<file path=ppt/slideLayouts/slideLayout18.xml><?xml version="1.0" encoding="utf-8"?>
+<p:sldLayout xmlns:a="http://schemas.openxmlformats.org/drawingml/2006/main" xmlns:r="http://schemas.openxmlformats.org/officeDocument/2006/relationships" xmlns:p="http://schemas.openxmlformats.org/presentationml/2006/main" showMasterSp="0" userDrawn="1">
+  <p:cSld name="Transition Slide Light">
+    <p:spTree>
+      <p:nvGrpSpPr>
+        <p:cNvPr id="1" name=""/>
+        <p:cNvGrpSpPr/>
+        <p:nvPr/>
+      </p:nvGrpSpPr>
+      <p:grpSpPr>
+        <a:xfrm>
+          <a:off x="0" y="0"/>
+          <a:ext cx="0" cy="0"/>
+          <a:chOff x="0" y="0"/>
+          <a:chExt cx="0" cy="0"/>
+        </a:xfrm>
+      </p:grpSpPr>
+      <p:sp>
+        <p:nvSpPr>
+          <p:cNvPr id="21" name="Text Placeholder 9">
+            <a:extLst>
+              <a:ext uri="{FF2B5EF4-FFF2-40B4-BE49-F238E27FC236}">
+                <a16:creationId xmlns:a16="http://schemas.microsoft.com/office/drawing/2014/main" id="{6979BEA5-6D16-3B4A-9CD1-2254B4BBF56F}"/>
+              </a:ext>
+            </a:extLst>
+          </p:cNvPr>
+          <p:cNvSpPr>
+            <a:spLocks noGrp="1"/>
+          </p:cNvSpPr>
+          <p:nvPr>
+            <p:ph type="body" sz="quarter" idx="11" hasCustomPrompt="1"/>
+          </p:nvPr>
+        </p:nvSpPr>
+        <p:spPr>
+          <a:xfrm>
+            <a:off x="587028" y="4047643"/>
+            <a:ext cx="6028267" cy="2027943"/>
+          </a:xfrm>
+          <a:prstGeom prst="rect">
+            <a:avLst/>
+          </a:prstGeom>
+        </p:spPr>
+        <p:txBody>
+          <a:bodyPr anchor="t"/>
+          <a:lstStyle>
+            <a:lvl1pPr marL="0" marR="0" indent="0" algn="l" defTabSz="609585" rtl="0" eaLnBrk="1" fontAlgn="auto" latinLnBrk="0" hangingPunct="1">
+              <a:lnSpc>
+                <a:spcPct val="90000"/>
+              </a:lnSpc>
+              <a:spcBef>
+                <a:spcPct val="0"/>
+              </a:spcBef>
+              <a:spcAft>
+                <a:spcPts val="0"/>
+              </a:spcAft>
+              <a:buClrTx/>
+              <a:buSzTx/>
+              <a:buFontTx/>
+              <a:buNone/>
+              <a:tabLst/>
+              <a:defRPr kumimoji="0" lang="en-US" sz="6400" b="0" i="0" u="none" strike="noStrike" kern="1200" cap="none" spc="0" normalizeH="0" baseline="0" dirty="0" smtClean="0">
+                <a:ln>
+                  <a:noFill/>
+                </a:ln>
+                <a:solidFill>
+                  <a:schemeClr val="tx1"/>
+                </a:solidFill>
+                <a:effectLst/>
+                <a:uLnTx/>
+                <a:uFillTx/>
+                <a:latin typeface="+mj-lt"/>
+                <a:ea typeface="Segoe UI Semibold" panose="020B0502040204020203" pitchFamily="34" charset="0"/>
+                <a:cs typeface="Segoe UI Semibold" panose="020B0502040204020203" pitchFamily="34" charset="0"/>
+              </a:defRPr>
+            </a:lvl1pPr>
+          </a:lstStyle>
+          <a:p>
+            <a:r>
+              <a:rPr lang="en-US" dirty="0"/>
+              <a:t>Section Title Goes Here</a:t>
+            </a:r>
+          </a:p>
+        </p:txBody>
+      </p:sp>
+      <p:pic>
+        <p:nvPicPr>
+          <p:cNvPr id="4" name="Picture 3">
+            <a:extLst>
+              <a:ext uri="{FF2B5EF4-FFF2-40B4-BE49-F238E27FC236}">
+                <a16:creationId xmlns:a16="http://schemas.microsoft.com/office/drawing/2014/main" id="{E47C8540-941D-D94F-BC94-EEC40908DC88}"/>
+              </a:ext>
+            </a:extLst>
+          </p:cNvPr>
+          <p:cNvPicPr>
+            <a:picLocks noChangeAspect="1"/>
+          </p:cNvPicPr>
+          <p:nvPr userDrawn="1"/>
+        </p:nvPicPr>
+        <p:blipFill rotWithShape="1">
+          <a:blip r:embed="rId2" cstate="screen">
+            <a:extLst>
+              <a:ext uri="{28A0092B-C50C-407E-A947-70E740481C1C}">
+                <a14:useLocalDpi xmlns:a14="http://schemas.microsoft.com/office/drawing/2010/main"/>
+              </a:ext>
+            </a:extLst>
+          </a:blip>
+          <a:srcRect t="42178" b="39980"/>
+          <a:stretch/>
+        </p:blipFill>
+        <p:spPr>
+          <a:xfrm>
+            <a:off x="244437" y="567397"/>
+            <a:ext cx="4582868" cy="817652"/>
+          </a:xfrm>
+          <a:prstGeom prst="rect">
+            <a:avLst/>
+          </a:prstGeom>
+        </p:spPr>
+      </p:pic>
+      <p:pic>
+        <p:nvPicPr>
+          <p:cNvPr id="5" name="Picture 4">
+            <a:extLst>
+              <a:ext uri="{FF2B5EF4-FFF2-40B4-BE49-F238E27FC236}">
+                <a16:creationId xmlns:a16="http://schemas.microsoft.com/office/drawing/2014/main" id="{39C0D9A0-4384-3C49-8927-804CEA6700A8}"/>
+              </a:ext>
+            </a:extLst>
+          </p:cNvPr>
+          <p:cNvPicPr>
+            <a:picLocks noChangeAspect="1"/>
+          </p:cNvPicPr>
+          <p:nvPr userDrawn="1"/>
+        </p:nvPicPr>
+        <p:blipFill rotWithShape="1">
+          <a:blip r:embed="rId3">
+            <a:alphaModFix/>
+          </a:blip>
+          <a:srcRect r="22406"/>
+          <a:stretch/>
+        </p:blipFill>
+        <p:spPr>
+          <a:xfrm>
+            <a:off x="8478857" y="1036310"/>
+            <a:ext cx="3713144" cy="4785380"/>
+          </a:xfrm>
+          <a:prstGeom prst="rect">
+            <a:avLst/>
+          </a:prstGeom>
+        </p:spPr>
+      </p:pic>
+    </p:spTree>
+    <p:extLst>
+      <p:ext uri="{BB962C8B-B14F-4D97-AF65-F5344CB8AC3E}">
+        <p14:creationId xmlns:p14="http://schemas.microsoft.com/office/powerpoint/2010/main" val="1775792465"/>
+      </p:ext>
+    </p:extLst>
+  </p:cSld>
+  <p:clrMapOvr>
+    <a:masterClrMapping/>
+  </p:clrMapOvr>
+</p:sldLayout>
+</file>
+
+<file path=ppt/slideLayouts/slideLayout19.xml><?xml version="1.0" encoding="utf-8"?>
+<p:sldLayout xmlns:a="http://schemas.openxmlformats.org/drawingml/2006/main" xmlns:r="http://schemas.openxmlformats.org/officeDocument/2006/relationships" xmlns:p="http://schemas.openxmlformats.org/presentationml/2006/main" userDrawn="1">
+  <p:cSld name="One up">
+    <p:spTree>
+      <p:nvGrpSpPr>
+        <p:cNvPr id="1" name=""/>
+        <p:cNvGrpSpPr/>
+        <p:nvPr/>
+      </p:nvGrpSpPr>
+      <p:grpSpPr>
+        <a:xfrm>
+          <a:off x="0" y="0"/>
+          <a:ext cx="0" cy="0"/>
+          <a:chOff x="0" y="0"/>
+          <a:chExt cx="0" cy="0"/>
+        </a:xfrm>
+      </p:grpSpPr>
+      <p:sp>
+        <p:nvSpPr>
+          <p:cNvPr id="2" name="Title 1">
+            <a:extLst>
+              <a:ext uri="{FF2B5EF4-FFF2-40B4-BE49-F238E27FC236}">
+                <a16:creationId xmlns:a16="http://schemas.microsoft.com/office/drawing/2014/main" id="{A6D9C8B4-3532-8649-B0E2-C7EDDB2F64D9}"/>
+              </a:ext>
+            </a:extLst>
+          </p:cNvPr>
+          <p:cNvSpPr>
+            <a:spLocks noGrp="1"/>
+          </p:cNvSpPr>
+          <p:nvPr>
+            <p:ph type="title" hasCustomPrompt="1"/>
+          </p:nvPr>
+        </p:nvSpPr>
+        <p:spPr>
+          <a:xfrm>
+            <a:off x="416993" y="583916"/>
+            <a:ext cx="11308283" cy="818705"/>
+          </a:xfrm>
+          <a:prstGeom prst="rect">
+            <a:avLst/>
+          </a:prstGeom>
+        </p:spPr>
+        <p:txBody>
+          <a:bodyPr/>
+          <a:lstStyle>
+            <a:lvl1pPr>
+              <a:defRPr sz="5333" b="0" i="0">
+                <a:latin typeface="Segoe UI" panose="020B0502040204020203" pitchFamily="34" charset="0"/>
+                <a:cs typeface="Segoe UI" panose="020B0502040204020203" pitchFamily="34" charset="0"/>
+              </a:defRPr>
+            </a:lvl1pPr>
+          </a:lstStyle>
+          <a:p>
+            <a:r>
+              <a:rPr lang="en-US" dirty="0"/>
+              <a:t>Slide Title Here</a:t>
+            </a:r>
+          </a:p>
+        </p:txBody>
+      </p:sp>
+      <p:sp>
+        <p:nvSpPr>
+          <p:cNvPr id="9" name="Text Placeholder 30">
+            <a:extLst>
+              <a:ext uri="{FF2B5EF4-FFF2-40B4-BE49-F238E27FC236}">
+                <a16:creationId xmlns:a16="http://schemas.microsoft.com/office/drawing/2014/main" id="{74EA10B5-BEA8-DF4A-95CD-639732E6CD48}"/>
+              </a:ext>
+            </a:extLst>
+          </p:cNvPr>
+          <p:cNvSpPr>
+            <a:spLocks noGrp="1"/>
+          </p:cNvSpPr>
+          <p:nvPr>
+            <p:ph type="body" sz="quarter" idx="10" hasCustomPrompt="1"/>
+          </p:nvPr>
+        </p:nvSpPr>
+        <p:spPr>
+          <a:xfrm>
+            <a:off x="416992" y="2784351"/>
+            <a:ext cx="11308283" cy="520700"/>
+          </a:xfrm>
+          <a:prstGeom prst="rect">
+            <a:avLst/>
+          </a:prstGeom>
+        </p:spPr>
+        <p:txBody>
+          <a:bodyPr anchor="t">
+            <a:noAutofit/>
+          </a:bodyPr>
+          <a:lstStyle>
+            <a:lvl1pPr marL="0" indent="0" algn="l" defTabSz="1219170" rtl="0" eaLnBrk="1" latinLnBrk="0" hangingPunct="1">
+              <a:spcBef>
+                <a:spcPct val="20000"/>
+              </a:spcBef>
+              <a:buClr>
+                <a:schemeClr val="accent3"/>
+              </a:buClr>
+              <a:buFont typeface="Arial"/>
+              <a:buNone/>
+              <a:defRPr lang="en-US" sz="3200" b="1" i="0" kern="1200" dirty="0">
+                <a:solidFill>
+                  <a:schemeClr val="accent1"/>
+                </a:solidFill>
+                <a:latin typeface="Segoe UI Semibold" panose="020B0502040204020203" pitchFamily="34" charset="0"/>
+                <a:ea typeface="Segoe UI Semibold" panose="020B0502040204020203" pitchFamily="34" charset="0"/>
+                <a:cs typeface="Segoe UI Semibold" panose="020B0502040204020203" pitchFamily="34" charset="0"/>
+              </a:defRPr>
+            </a:lvl1pPr>
+          </a:lstStyle>
+          <a:p>
+            <a:pPr marL="0" lvl="0" indent="0" algn="l" defTabSz="1219170" rtl="0" eaLnBrk="1" latinLnBrk="0" hangingPunct="1">
+              <a:spcBef>
+                <a:spcPct val="20000"/>
+              </a:spcBef>
+              <a:buClr>
+                <a:schemeClr val="accent3"/>
+              </a:buClr>
+              <a:buFont typeface="Arial"/>
+              <a:buNone/>
+            </a:pPr>
+            <a:r>
+              <a:rPr lang="en-US" dirty="0"/>
+              <a:t>Heading</a:t>
+            </a:r>
+          </a:p>
+        </p:txBody>
+      </p:sp>
+      <p:sp>
+        <p:nvSpPr>
+          <p:cNvPr id="10" name="Text Placeholder 6">
+            <a:extLst>
+              <a:ext uri="{FF2B5EF4-FFF2-40B4-BE49-F238E27FC236}">
+                <a16:creationId xmlns:a16="http://schemas.microsoft.com/office/drawing/2014/main" id="{F7B1DCCF-44AE-4447-A5D2-2B31454F7C55}"/>
+              </a:ext>
+            </a:extLst>
+          </p:cNvPr>
+          <p:cNvSpPr>
+            <a:spLocks noGrp="1"/>
+          </p:cNvSpPr>
+          <p:nvPr>
+            <p:ph type="body" sz="quarter" idx="21" hasCustomPrompt="1"/>
+          </p:nvPr>
+        </p:nvSpPr>
+        <p:spPr>
+          <a:xfrm>
+            <a:off x="416992" y="3436267"/>
+            <a:ext cx="11308283" cy="2907536"/>
+          </a:xfrm>
+          <a:prstGeom prst="rect">
+            <a:avLst/>
+          </a:prstGeom>
+        </p:spPr>
+        <p:txBody>
+          <a:bodyPr/>
+          <a:lstStyle>
+            <a:lvl1pPr marL="0" indent="0" algn="l" defTabSz="1219170" rtl="0" eaLnBrk="1" latinLnBrk="0" hangingPunct="1">
+              <a:lnSpc>
+                <a:spcPct val="100000"/>
+              </a:lnSpc>
+              <a:spcBef>
+                <a:spcPct val="20000"/>
+              </a:spcBef>
+              <a:spcAft>
+                <a:spcPts val="0"/>
+              </a:spcAft>
+              <a:buClr>
+                <a:schemeClr val="accent3"/>
+              </a:buClr>
+              <a:buFont typeface="Arial"/>
+              <a:buNone/>
+              <a:defRPr lang="en-US" sz="3200" b="0" i="0" kern="1200" dirty="0">
+                <a:solidFill>
+                  <a:schemeClr val="tx2"/>
+                </a:solidFill>
+                <a:latin typeface="+mn-lt"/>
+                <a:ea typeface="Segoe UI Semibold" panose="020B0502040204020203" pitchFamily="34" charset="0"/>
+                <a:cs typeface="Segoe UI Semibold" panose="020B0502040204020203" pitchFamily="34" charset="0"/>
+              </a:defRPr>
+            </a:lvl1pPr>
+          </a:lstStyle>
+          <a:p>
+            <a:pPr marL="0" lvl="0" indent="0" algn="l" defTabSz="1219170" rtl="0" eaLnBrk="1" latinLnBrk="0" hangingPunct="1">
+              <a:spcBef>
+                <a:spcPct val="20000"/>
+              </a:spcBef>
+              <a:buClr>
+                <a:schemeClr val="accent3"/>
+              </a:buClr>
+              <a:buFont typeface="Arial"/>
+              <a:buNone/>
+            </a:pPr>
+            <a:r>
+              <a:rPr lang="en-US" dirty="0"/>
+              <a:t>Lorem ipsum dolor sit </a:t>
+            </a:r>
+            <a:r>
+              <a:rPr lang="en-US" dirty="0" err="1"/>
+              <a:t>amet</a:t>
+            </a:r>
+            <a:r>
+              <a:rPr lang="en-US" dirty="0"/>
+              <a:t>, </a:t>
+            </a:r>
+            <a:r>
+              <a:rPr lang="en-US" dirty="0" err="1"/>
+              <a:t>consectetur</a:t>
+            </a:r>
+            <a:r>
+              <a:rPr lang="en-US" dirty="0"/>
+              <a:t> </a:t>
+            </a:r>
+            <a:r>
+              <a:rPr lang="en-US" dirty="0" err="1"/>
+              <a:t>adipiscing</a:t>
+            </a:r>
+            <a:r>
+              <a:rPr lang="en-US" dirty="0"/>
+              <a:t> </a:t>
+            </a:r>
+            <a:r>
+              <a:rPr lang="en-US" dirty="0" err="1"/>
+              <a:t>elit</a:t>
+            </a:r>
+            <a:r>
+              <a:rPr lang="en-US" dirty="0"/>
+              <a:t>. </a:t>
+            </a:r>
+            <a:r>
+              <a:rPr lang="en-US" dirty="0" err="1"/>
+              <a:t>Quisque</a:t>
+            </a:r>
+            <a:r>
+              <a:rPr lang="en-US" dirty="0"/>
+              <a:t> convallis in </a:t>
+            </a:r>
+            <a:r>
+              <a:rPr lang="en-US" dirty="0" err="1"/>
+              <a:t>enim</a:t>
+            </a:r>
+            <a:r>
+              <a:rPr lang="en-US" dirty="0"/>
+              <a:t> non </a:t>
+            </a:r>
+            <a:r>
+              <a:rPr lang="en-US" dirty="0" err="1"/>
+              <a:t>consectetur</a:t>
+            </a:r>
+            <a:r>
+              <a:rPr lang="en-US" dirty="0"/>
+              <a:t>. </a:t>
+            </a:r>
+          </a:p>
+        </p:txBody>
+      </p:sp>
+    </p:spTree>
+    <p:extLst>
+      <p:ext uri="{BB962C8B-B14F-4D97-AF65-F5344CB8AC3E}">
+        <p14:creationId xmlns:p14="http://schemas.microsoft.com/office/powerpoint/2010/main" val="1064752906"/>
+      </p:ext>
+    </p:extLst>
   </p:cSld>
   <p:clrMapOvr>
     <a:masterClrMapping/>
@@ -5045,7 +5650,7 @@
           <a:p>
             <a:fld id="{48A87A34-81AB-432B-8DAE-1953F412C126}" type="datetimeFigureOut">
               <a:rPr lang="en-US" dirty="0"/>
-              <a:t>8/24/20</a:t>
+              <a:t>8/29/20</a:t>
             </a:fld>
             <a:endParaRPr lang="en-US" dirty="0"/>
           </a:p>
@@ -5330,7 +5935,7 @@
             <a:fld id="{48A87A34-81AB-432B-8DAE-1953F412C126}" type="datetimeFigureOut">
               <a:rPr lang="en-US" dirty="0"/>
               <a:pPr/>
-              <a:t>8/24/20</a:t>
+              <a:t>8/29/20</a:t>
             </a:fld>
             <a:endParaRPr lang="en-US" dirty="0"/>
           </a:p>
@@ -5567,7 +6172,7 @@
           <a:p>
             <a:fld id="{48A87A34-81AB-432B-8DAE-1953F412C126}" type="datetimeFigureOut">
               <a:rPr lang="en-US" dirty="0"/>
-              <a:t>8/24/20</a:t>
+              <a:t>8/29/20</a:t>
             </a:fld>
             <a:endParaRPr lang="en-US" dirty="0"/>
           </a:p>
@@ -5941,7 +6546,7 @@
           <a:p>
             <a:fld id="{48A87A34-81AB-432B-8DAE-1953F412C126}" type="datetimeFigureOut">
               <a:rPr lang="en-US" dirty="0"/>
-              <a:t>8/24/20</a:t>
+              <a:t>8/29/20</a:t>
             </a:fld>
             <a:endParaRPr lang="en-US" dirty="0"/>
           </a:p>
@@ -6054,7 +6659,7 @@
           <a:p>
             <a:fld id="{48A87A34-81AB-432B-8DAE-1953F412C126}" type="datetimeFigureOut">
               <a:rPr lang="en-US" dirty="0"/>
-              <a:t>8/24/20</a:t>
+              <a:t>8/29/20</a:t>
             </a:fld>
             <a:endParaRPr lang="en-US" dirty="0"/>
           </a:p>
@@ -6144,7 +6749,7 @@
           <a:p>
             <a:fld id="{48A87A34-81AB-432B-8DAE-1953F412C126}" type="datetimeFigureOut">
               <a:rPr lang="en-US" dirty="0"/>
-              <a:t>8/24/20</a:t>
+              <a:t>8/29/20</a:t>
             </a:fld>
             <a:endParaRPr lang="en-US" dirty="0"/>
           </a:p>
@@ -6388,7 +6993,7 @@
           <a:p>
             <a:fld id="{48A87A34-81AB-432B-8DAE-1953F412C126}" type="datetimeFigureOut">
               <a:rPr lang="en-US" dirty="0"/>
-              <a:t>8/24/20</a:t>
+              <a:t>8/29/20</a:t>
             </a:fld>
             <a:endParaRPr lang="en-US" dirty="0"/>
           </a:p>
@@ -6639,7 +7244,7 @@
           <a:p>
             <a:fld id="{48A87A34-81AB-432B-8DAE-1953F412C126}" type="datetimeFigureOut">
               <a:rPr lang="en-US" dirty="0"/>
-              <a:t>8/24/20</a:t>
+              <a:t>8/29/20</a:t>
             </a:fld>
             <a:endParaRPr lang="en-US" dirty="0"/>
           </a:p>
@@ -6726,7 +7331,7 @@
           <p:nvPr/>
         </p:nvPicPr>
         <p:blipFill>
-          <a:blip r:embed="rId19">
+          <a:blip r:embed="rId21">
             <a:extLst>
               <a:ext uri="{28A0092B-C50C-407E-A947-70E740481C1C}">
                 <a14:useLocalDpi xmlns:a14="http://schemas.microsoft.com/office/drawing/2010/main" val="0"/>
@@ -6878,7 +7483,7 @@
             <a:fld id="{48A87A34-81AB-432B-8DAE-1953F412C126}" type="datetimeFigureOut">
               <a:rPr lang="en-US" dirty="0"/>
               <a:pPr/>
-              <a:t>8/24/20</a:t>
+              <a:t>8/29/20</a:t>
             </a:fld>
             <a:endParaRPr lang="en-US" dirty="0"/>
           </a:p>
@@ -6984,6 +7589,8 @@
     <p:sldLayoutId id="2147483668" r:id="rId15"/>
     <p:sldLayoutId id="2147483658" r:id="rId16"/>
     <p:sldLayoutId id="2147483659" r:id="rId17"/>
+    <p:sldLayoutId id="2147483669" r:id="rId18"/>
+    <p:sldLayoutId id="2147483670" r:id="rId19"/>
   </p:sldLayoutIdLst>
   <p:txStyles>
     <p:titleStyle>
@@ -7587,6 +8194,301 @@
             <p:ph type="title"/>
           </p:nvPr>
         </p:nvSpPr>
+        <p:spPr>
+          <a:xfrm>
+            <a:off x="765109" y="764374"/>
+            <a:ext cx="10741091" cy="1293028"/>
+          </a:xfrm>
+        </p:spPr>
+        <p:txBody>
+          <a:bodyPr/>
+          <a:lstStyle/>
+          <a:p>
+            <a:r>
+              <a:rPr lang="en-US" dirty="0"/>
+              <a:t>Basic Phone screen or first Interview </a:t>
+            </a:r>
+          </a:p>
+        </p:txBody>
+      </p:sp>
+      <p:sp>
+        <p:nvSpPr>
+          <p:cNvPr id="3" name="Content Placeholder 2"/>
+          <p:cNvSpPr>
+            <a:spLocks noGrp="1"/>
+          </p:cNvSpPr>
+          <p:nvPr>
+            <p:ph idx="1"/>
+          </p:nvPr>
+        </p:nvSpPr>
+        <p:spPr/>
+        <p:txBody>
+          <a:bodyPr/>
+          <a:lstStyle/>
+          <a:p>
+            <a:r>
+              <a:rPr lang="en-US" dirty="0"/>
+              <a:t>Almost</a:t>
+            </a:r>
+            <a:r>
+              <a:rPr lang="en-US" baseline="0" dirty="0"/>
+              <a:t> every “1</a:t>
+            </a:r>
+            <a:r>
+              <a:rPr lang="en-US" baseline="30000" dirty="0"/>
+              <a:t>st</a:t>
+            </a:r>
+            <a:r>
+              <a:rPr lang="en-US" baseline="0" dirty="0"/>
+              <a:t>” interview is a basic question and answer session.</a:t>
+            </a:r>
+          </a:p>
+          <a:p>
+            <a:pPr lvl="1"/>
+            <a:r>
+              <a:rPr lang="en-US" dirty="0"/>
+              <a:t>What is your plan for 5 years</a:t>
+            </a:r>
+          </a:p>
+          <a:p>
+            <a:pPr lvl="1"/>
+            <a:r>
+              <a:rPr lang="en-US" dirty="0"/>
+              <a:t>When</a:t>
+            </a:r>
+            <a:r>
+              <a:rPr lang="en-US" baseline="0" dirty="0"/>
+              <a:t> did you fail</a:t>
+            </a:r>
+          </a:p>
+          <a:p>
+            <a:pPr lvl="2"/>
+            <a:r>
+              <a:rPr lang="en-US" baseline="0" dirty="0"/>
+              <a:t>What have you learned from your mistakes</a:t>
+            </a:r>
+          </a:p>
+          <a:p>
+            <a:pPr lvl="1"/>
+            <a:r>
+              <a:rPr lang="en-US" dirty="0"/>
+              <a:t>How</a:t>
+            </a:r>
+            <a:r>
+              <a:rPr lang="en-US" baseline="0" dirty="0"/>
+              <a:t> much money do you want</a:t>
+            </a:r>
+          </a:p>
+          <a:p>
+            <a:pPr lvl="1"/>
+            <a:r>
+              <a:rPr lang="en-US" baseline="0" dirty="0"/>
+              <a:t>Can we contact your references</a:t>
+            </a:r>
+          </a:p>
+          <a:p>
+            <a:pPr lvl="1"/>
+            <a:r>
+              <a:rPr lang="en-US" dirty="0"/>
+              <a:t>Ability to think on your feet – Not technical</a:t>
+            </a:r>
+          </a:p>
+          <a:p>
+            <a:pPr lvl="1"/>
+            <a:r>
+              <a:rPr lang="en-US" dirty="0"/>
+              <a:t>Availability</a:t>
+            </a:r>
+          </a:p>
+          <a:p>
+            <a:pPr lvl="2"/>
+            <a:r>
+              <a:rPr lang="en-US" dirty="0"/>
+              <a:t>Two week notice or loose ends that need to be tied up (large projects).</a:t>
+            </a:r>
+          </a:p>
+          <a:p>
+            <a:pPr lvl="1"/>
+            <a:r>
+              <a:rPr lang="en-US" dirty="0"/>
+              <a:t>Motivation for this position</a:t>
+            </a:r>
+          </a:p>
+        </p:txBody>
+      </p:sp>
+    </p:spTree>
+    <p:extLst>
+      <p:ext uri="{BB962C8B-B14F-4D97-AF65-F5344CB8AC3E}">
+        <p14:creationId xmlns:p14="http://schemas.microsoft.com/office/powerpoint/2010/main" val="568820236"/>
+      </p:ext>
+    </p:extLst>
+  </p:cSld>
+  <p:clrMapOvr>
+    <a:masterClrMapping/>
+  </p:clrMapOvr>
+</p:sld>
+</file>
+
+<file path=ppt/slides/slide11.xml><?xml version="1.0" encoding="utf-8"?>
+<p:sld xmlns:a="http://schemas.openxmlformats.org/drawingml/2006/main" xmlns:r="http://schemas.openxmlformats.org/officeDocument/2006/relationships" xmlns:p="http://schemas.openxmlformats.org/presentationml/2006/main">
+  <p:cSld>
+    <p:spTree>
+      <p:nvGrpSpPr>
+        <p:cNvPr id="1" name=""/>
+        <p:cNvGrpSpPr/>
+        <p:nvPr/>
+      </p:nvGrpSpPr>
+      <p:grpSpPr>
+        <a:xfrm>
+          <a:off x="0" y="0"/>
+          <a:ext cx="0" cy="0"/>
+          <a:chOff x="0" y="0"/>
+          <a:chExt cx="0" cy="0"/>
+        </a:xfrm>
+      </p:grpSpPr>
+      <p:sp>
+        <p:nvSpPr>
+          <p:cNvPr id="2" name="Title 1"/>
+          <p:cNvSpPr>
+            <a:spLocks noGrp="1"/>
+          </p:cNvSpPr>
+          <p:nvPr>
+            <p:ph type="title"/>
+          </p:nvPr>
+        </p:nvSpPr>
+        <p:spPr/>
+        <p:txBody>
+          <a:bodyPr/>
+          <a:lstStyle/>
+          <a:p>
+            <a:r>
+              <a:rPr lang="en-US" dirty="0"/>
+              <a:t>Technical or follow-up</a:t>
+            </a:r>
+          </a:p>
+        </p:txBody>
+      </p:sp>
+      <p:sp>
+        <p:nvSpPr>
+          <p:cNvPr id="3" name="Content Placeholder 2"/>
+          <p:cNvSpPr>
+            <a:spLocks noGrp="1"/>
+          </p:cNvSpPr>
+          <p:nvPr>
+            <p:ph idx="1"/>
+          </p:nvPr>
+        </p:nvSpPr>
+        <p:spPr/>
+        <p:txBody>
+          <a:bodyPr>
+            <a:normAutofit/>
+          </a:bodyPr>
+          <a:lstStyle/>
+          <a:p>
+            <a:r>
+              <a:rPr lang="en-US" dirty="0"/>
+              <a:t>Calm down (remember you’re smart) you made it through one interview</a:t>
+            </a:r>
+          </a:p>
+          <a:p>
+            <a:r>
+              <a:rPr lang="en-US" dirty="0"/>
+              <a:t>Plan on getting to the interview earlier (10-15 minutes)</a:t>
+            </a:r>
+          </a:p>
+          <a:p>
+            <a:r>
+              <a:rPr lang="en-US" dirty="0"/>
+              <a:t>If you need caffeine have your normal amount (don’t power bomb 2 Rock Stars to be “on”)</a:t>
+            </a:r>
+          </a:p>
+          <a:p>
+            <a:r>
+              <a:rPr lang="en-US" dirty="0"/>
+              <a:t>Lets</a:t>
+            </a:r>
+            <a:r>
+              <a:rPr lang="en-US" baseline="0" dirty="0"/>
+              <a:t> look at some questions:</a:t>
+            </a:r>
+          </a:p>
+          <a:p>
+            <a:pPr lvl="1"/>
+            <a:r>
+              <a:rPr lang="en-US" dirty="0"/>
+              <a:t>The</a:t>
+            </a:r>
+            <a:r>
+              <a:rPr lang="en-US" baseline="0" dirty="0"/>
+              <a:t> list of questions come from SQL Server 2000 and above.</a:t>
+            </a:r>
+          </a:p>
+          <a:p>
+            <a:pPr lvl="1"/>
+            <a:r>
+              <a:rPr lang="en-US" baseline="0" dirty="0"/>
+              <a:t>We should all know these questions</a:t>
+            </a:r>
+          </a:p>
+          <a:p>
+            <a:pPr lvl="1"/>
+            <a:r>
+              <a:rPr lang="en-US" baseline="0" dirty="0"/>
+              <a:t>We’ve adapted  some of the questions for “interview” style</a:t>
+            </a:r>
+            <a:r>
+              <a:rPr lang="en-US" dirty="0"/>
+              <a:t> but the information is pretty basic</a:t>
+            </a:r>
+          </a:p>
+          <a:p>
+            <a:r>
+              <a:rPr lang="en-US" dirty="0"/>
+              <a:t>Remember to stay calm, if you don’t know something say so.</a:t>
+            </a:r>
+          </a:p>
+        </p:txBody>
+      </p:sp>
+    </p:spTree>
+    <p:extLst>
+      <p:ext uri="{BB962C8B-B14F-4D97-AF65-F5344CB8AC3E}">
+        <p14:creationId xmlns:p14="http://schemas.microsoft.com/office/powerpoint/2010/main" val="2232111454"/>
+      </p:ext>
+    </p:extLst>
+  </p:cSld>
+  <p:clrMapOvr>
+    <a:masterClrMapping/>
+  </p:clrMapOvr>
+</p:sld>
+</file>
+
+<file path=ppt/slides/slide12.xml><?xml version="1.0" encoding="utf-8"?>
+<p:sld xmlns:a="http://schemas.openxmlformats.org/drawingml/2006/main" xmlns:r="http://schemas.openxmlformats.org/officeDocument/2006/relationships" xmlns:p="http://schemas.openxmlformats.org/presentationml/2006/main">
+  <p:cSld>
+    <p:spTree>
+      <p:nvGrpSpPr>
+        <p:cNvPr id="1" name=""/>
+        <p:cNvGrpSpPr/>
+        <p:nvPr/>
+      </p:nvGrpSpPr>
+      <p:grpSpPr>
+        <a:xfrm>
+          <a:off x="0" y="0"/>
+          <a:ext cx="0" cy="0"/>
+          <a:chOff x="0" y="0"/>
+          <a:chExt cx="0" cy="0"/>
+        </a:xfrm>
+      </p:grpSpPr>
+      <p:sp>
+        <p:nvSpPr>
+          <p:cNvPr id="2" name="Title 1"/>
+          <p:cNvSpPr>
+            <a:spLocks noGrp="1"/>
+          </p:cNvSpPr>
+          <p:nvPr>
+            <p:ph type="title"/>
+          </p:nvPr>
+        </p:nvSpPr>
         <p:spPr/>
         <p:txBody>
           <a:bodyPr/>
@@ -7789,7 +8691,7 @@
 </p:sld>
 </file>
 
-<file path=ppt/slides/slide11.xml><?xml version="1.0" encoding="utf-8"?>
+<file path=ppt/slides/slide13.xml><?xml version="1.0" encoding="utf-8"?>
 <p:sld xmlns:a="http://schemas.openxmlformats.org/drawingml/2006/main" xmlns:r="http://schemas.openxmlformats.org/officeDocument/2006/relationships" xmlns:p="http://schemas.openxmlformats.org/presentationml/2006/main">
   <p:cSld>
     <p:spTree>
@@ -7911,7 +8813,219 @@
 </p:sld>
 </file>
 
-<file path=ppt/slides/slide12.xml><?xml version="1.0" encoding="utf-8"?>
+<file path=ppt/slides/slide14.xml><?xml version="1.0" encoding="utf-8"?>
+<p:sld xmlns:a="http://schemas.openxmlformats.org/drawingml/2006/main" xmlns:r="http://schemas.openxmlformats.org/officeDocument/2006/relationships" xmlns:p="http://schemas.openxmlformats.org/presentationml/2006/main">
+  <p:cSld>
+    <p:spTree>
+      <p:nvGrpSpPr>
+        <p:cNvPr id="1" name=""/>
+        <p:cNvGrpSpPr/>
+        <p:nvPr/>
+      </p:nvGrpSpPr>
+      <p:grpSpPr>
+        <a:xfrm>
+          <a:off x="0" y="0"/>
+          <a:ext cx="0" cy="0"/>
+          <a:chOff x="0" y="0"/>
+          <a:chExt cx="0" cy="0"/>
+        </a:xfrm>
+      </p:grpSpPr>
+      <p:sp>
+        <p:nvSpPr>
+          <p:cNvPr id="3" name="TextBox 2">
+            <a:extLst>
+              <a:ext uri="{FF2B5EF4-FFF2-40B4-BE49-F238E27FC236}">
+                <a16:creationId xmlns:a16="http://schemas.microsoft.com/office/drawing/2014/main" id="{9BB52DC4-44E5-469C-BC98-D3F9D5B87F3B}"/>
+              </a:ext>
+            </a:extLst>
+          </p:cNvPr>
+          <p:cNvSpPr txBox="1"/>
+          <p:nvPr/>
+        </p:nvSpPr>
+        <p:spPr>
+          <a:xfrm>
+            <a:off x="1047750" y="2190749"/>
+            <a:ext cx="7600950" cy="3077766"/>
+          </a:xfrm>
+          <a:prstGeom prst="rect">
+            <a:avLst/>
+          </a:prstGeom>
+          <a:noFill/>
+        </p:spPr>
+        <p:txBody>
+          <a:bodyPr wrap="square" rtlCol="0">
+            <a:spAutoFit/>
+          </a:bodyPr>
+          <a:lstStyle/>
+          <a:p>
+            <a:r>
+              <a:rPr lang="en-US" sz="4400" dirty="0"/>
+              <a:t>Session Evaluations</a:t>
+            </a:r>
+          </a:p>
+          <a:p>
+            <a:endParaRPr lang="en-US" sz="2000" dirty="0"/>
+          </a:p>
+          <a:p>
+            <a:r>
+              <a:rPr lang="en-US" sz="2000" dirty="0">
+                <a:hlinkClick r:id="rId3"/>
+              </a:rPr>
+              <a:t>https://www.sqlsaturday.com/997/Sessions/Session-Evaluation</a:t>
+            </a:r>
+            <a:endParaRPr lang="en-US" sz="2000" dirty="0"/>
+          </a:p>
+          <a:p>
+            <a:endParaRPr lang="en-US" sz="2000" dirty="0"/>
+          </a:p>
+          <a:p>
+            <a:r>
+              <a:rPr lang="en-US" sz="2400" dirty="0"/>
+              <a:t>Alternatively go to the Schedule and click on the session you would like to give feedback on and click </a:t>
+            </a:r>
+            <a:r>
+              <a:rPr lang="en-US" sz="2400" b="1" i="1" dirty="0"/>
+              <a:t>Session Evaluation</a:t>
+            </a:r>
+          </a:p>
+          <a:p>
+            <a:endParaRPr lang="en-US" dirty="0"/>
+          </a:p>
+        </p:txBody>
+      </p:sp>
+    </p:spTree>
+    <p:extLst>
+      <p:ext uri="{BB962C8B-B14F-4D97-AF65-F5344CB8AC3E}">
+        <p14:creationId xmlns:p14="http://schemas.microsoft.com/office/powerpoint/2010/main" val="2185931284"/>
+      </p:ext>
+    </p:extLst>
+  </p:cSld>
+  <p:clrMapOvr>
+    <a:masterClrMapping/>
+  </p:clrMapOvr>
+</p:sld>
+</file>
+
+<file path=ppt/slides/slide15.xml><?xml version="1.0" encoding="utf-8"?>
+<p:sld xmlns:a="http://schemas.openxmlformats.org/drawingml/2006/main" xmlns:r="http://schemas.openxmlformats.org/officeDocument/2006/relationships" xmlns:p="http://schemas.openxmlformats.org/presentationml/2006/main">
+  <p:cSld>
+    <p:spTree>
+      <p:nvGrpSpPr>
+        <p:cNvPr id="1" name=""/>
+        <p:cNvGrpSpPr/>
+        <p:nvPr/>
+      </p:nvGrpSpPr>
+      <p:grpSpPr>
+        <a:xfrm>
+          <a:off x="0" y="0"/>
+          <a:ext cx="0" cy="0"/>
+          <a:chOff x="0" y="0"/>
+          <a:chExt cx="0" cy="0"/>
+        </a:xfrm>
+      </p:grpSpPr>
+      <p:sp>
+        <p:nvSpPr>
+          <p:cNvPr id="3" name="TextBox 2">
+            <a:extLst>
+              <a:ext uri="{FF2B5EF4-FFF2-40B4-BE49-F238E27FC236}">
+                <a16:creationId xmlns:a16="http://schemas.microsoft.com/office/drawing/2014/main" id="{2DB4ACCA-C098-4BDA-B46C-A73945674105}"/>
+              </a:ext>
+            </a:extLst>
+          </p:cNvPr>
+          <p:cNvSpPr txBox="1"/>
+          <p:nvPr/>
+        </p:nvSpPr>
+        <p:spPr>
+          <a:xfrm>
+            <a:off x="333375" y="1819275"/>
+            <a:ext cx="7724775" cy="4339650"/>
+          </a:xfrm>
+          <a:prstGeom prst="rect">
+            <a:avLst/>
+          </a:prstGeom>
+          <a:noFill/>
+        </p:spPr>
+        <p:txBody>
+          <a:bodyPr wrap="square" rtlCol="0">
+            <a:spAutoFit/>
+          </a:bodyPr>
+          <a:lstStyle/>
+          <a:p>
+            <a:r>
+              <a:rPr lang="en-US" sz="2600" b="1" i="1" dirty="0"/>
+              <a:t>Utah Geek Events slack channels for attendees to chat</a:t>
+            </a:r>
+          </a:p>
+          <a:p>
+            <a:endParaRPr lang="en-US" dirty="0"/>
+          </a:p>
+          <a:p>
+            <a:r>
+              <a:rPr lang="en-US" sz="2400" dirty="0"/>
+              <a:t>To get an invite to the Slack Space</a:t>
+            </a:r>
+          </a:p>
+          <a:p>
+            <a:r>
+              <a:rPr lang="en-US" sz="3200" dirty="0">
+                <a:hlinkClick r:id="rId2"/>
+              </a:rPr>
+              <a:t>http://bit.ly/2bm3vwW</a:t>
+            </a:r>
+            <a:endParaRPr lang="en-US" sz="3200" dirty="0"/>
+          </a:p>
+          <a:p>
+            <a:endParaRPr lang="en-US" dirty="0"/>
+          </a:p>
+          <a:p>
+            <a:r>
+              <a:rPr lang="en-US" sz="2800" b="1" i="1" dirty="0"/>
+              <a:t>Channels</a:t>
+            </a:r>
+          </a:p>
+          <a:p>
+            <a:r>
+              <a:rPr lang="en-US" sz="2800" dirty="0"/>
+              <a:t>#sqlsaturday997_room1</a:t>
+            </a:r>
+          </a:p>
+          <a:p>
+            <a:r>
+              <a:rPr lang="en-US" sz="2800" dirty="0"/>
+              <a:t>#sqlsaturday997_room2</a:t>
+            </a:r>
+          </a:p>
+          <a:p>
+            <a:r>
+              <a:rPr lang="en-US" sz="2800" dirty="0"/>
+              <a:t>#sqlsaturday997_room3</a:t>
+            </a:r>
+          </a:p>
+          <a:p>
+            <a:r>
+              <a:rPr lang="en-US" sz="2800" dirty="0"/>
+              <a:t>#sqlsaturday997_room4</a:t>
+            </a:r>
+          </a:p>
+          <a:p>
+            <a:endParaRPr lang="en-US" dirty="0"/>
+          </a:p>
+        </p:txBody>
+      </p:sp>
+    </p:spTree>
+    <p:extLst>
+      <p:ext uri="{BB962C8B-B14F-4D97-AF65-F5344CB8AC3E}">
+        <p14:creationId xmlns:p14="http://schemas.microsoft.com/office/powerpoint/2010/main" val="1051730460"/>
+      </p:ext>
+    </p:extLst>
+  </p:cSld>
+  <p:clrMapOvr>
+    <a:masterClrMapping/>
+  </p:clrMapOvr>
+</p:sld>
+</file>
+
+<file path=ppt/slides/slide16.xml><?xml version="1.0" encoding="utf-8"?>
 <p:sld xmlns:a="http://schemas.openxmlformats.org/drawingml/2006/main" xmlns:r="http://schemas.openxmlformats.org/officeDocument/2006/relationships" xmlns:p="http://schemas.openxmlformats.org/presentationml/2006/main">
   <p:cSld>
     <p:spTree>
@@ -8055,122 +9169,421 @@
       </p:grpSpPr>
       <p:sp>
         <p:nvSpPr>
-          <p:cNvPr id="2" name="Title 1"/>
-          <p:cNvSpPr>
-            <a:spLocks noGrp="1"/>
-          </p:cNvSpPr>
-          <p:nvPr>
-            <p:ph type="title"/>
-          </p:nvPr>
-        </p:nvSpPr>
-        <p:spPr/>
+          <p:cNvPr id="13" name="Rectangle 12">
+            <a:extLst>
+              <a:ext uri="{FF2B5EF4-FFF2-40B4-BE49-F238E27FC236}">
+                <a16:creationId xmlns:a16="http://schemas.microsoft.com/office/drawing/2014/main" id="{EB4C4037-60C8-4EF1-9028-88C738B52A52}"/>
+              </a:ext>
+            </a:extLst>
+          </p:cNvPr>
+          <p:cNvSpPr/>
+          <p:nvPr/>
+        </p:nvSpPr>
+        <p:spPr>
+          <a:xfrm>
+            <a:off x="5730843" y="609325"/>
+            <a:ext cx="6461157" cy="5886993"/>
+          </a:xfrm>
+          <a:prstGeom prst="rect">
+            <a:avLst/>
+          </a:prstGeom>
+          <a:solidFill>
+            <a:schemeClr val="bg2"/>
+          </a:solidFill>
+          <a:ln>
+            <a:solidFill>
+              <a:schemeClr val="bg2"/>
+            </a:solidFill>
+          </a:ln>
+        </p:spPr>
+        <p:style>
+          <a:lnRef idx="2">
+            <a:schemeClr val="accent1">
+              <a:shade val="50000"/>
+            </a:schemeClr>
+          </a:lnRef>
+          <a:fillRef idx="1">
+            <a:schemeClr val="accent1"/>
+          </a:fillRef>
+          <a:effectRef idx="0">
+            <a:schemeClr val="accent1"/>
+          </a:effectRef>
+          <a:fontRef idx="minor">
+            <a:schemeClr val="lt1"/>
+          </a:fontRef>
+        </p:style>
+        <p:txBody>
+          <a:bodyPr rtlCol="0" anchor="ctr"/>
+          <a:lstStyle/>
+          <a:p>
+            <a:pPr algn="ctr"/>
+            <a:endParaRPr lang="en-US" sz="2400"/>
+          </a:p>
+        </p:txBody>
+      </p:sp>
+      <p:sp>
+        <p:nvSpPr>
+          <p:cNvPr id="2" name="Text Placeholder 1">
+            <a:extLst>
+              <a:ext uri="{FF2B5EF4-FFF2-40B4-BE49-F238E27FC236}">
+                <a16:creationId xmlns:a16="http://schemas.microsoft.com/office/drawing/2014/main" id="{05789A90-8FE5-A846-B018-A96E691FC689}"/>
+              </a:ext>
+            </a:extLst>
+          </p:cNvPr>
+          <p:cNvSpPr>
+            <a:spLocks noGrp="1"/>
+          </p:cNvSpPr>
+          <p:nvPr>
+            <p:ph type="body" sz="quarter" idx="11"/>
+          </p:nvPr>
+        </p:nvSpPr>
+        <p:spPr>
+          <a:xfrm>
+            <a:off x="551552" y="1988539"/>
+            <a:ext cx="4987648" cy="3994237"/>
+          </a:xfrm>
+        </p:spPr>
         <p:txBody>
           <a:bodyPr/>
           <a:lstStyle/>
           <a:p>
             <a:r>
-              <a:rPr lang="en-US"/>
-              <a:t>Agenda</a:t>
-            </a:r>
-            <a:endParaRPr lang="en-US" dirty="0"/>
-          </a:p>
-        </p:txBody>
-      </p:sp>
-      <p:sp>
-        <p:nvSpPr>
-          <p:cNvPr id="3" name="Content Placeholder 2"/>
-          <p:cNvSpPr>
-            <a:spLocks noGrp="1"/>
-          </p:cNvSpPr>
-          <p:nvPr>
-            <p:ph idx="1"/>
-          </p:nvPr>
-        </p:nvSpPr>
-        <p:spPr>
-          <a:xfrm>
-            <a:off x="515815" y="2194562"/>
-            <a:ext cx="10990385" cy="4024125"/>
-          </a:xfrm>
-        </p:spPr>
-        <p:txBody>
-          <a:bodyPr>
-            <a:normAutofit/>
-          </a:bodyPr>
-          <a:lstStyle/>
-          <a:p>
-            <a:r>
-              <a:rPr lang="en-US" dirty="0"/>
-              <a:t>We are really </a:t>
-            </a:r>
-            <a:r>
-              <a:rPr lang="en-US" i="1" dirty="0"/>
-              <a:t>really</a:t>
-            </a:r>
-            <a:r>
-              <a:rPr lang="en-US" dirty="0"/>
-              <a:t> smart, but can we show our best side when we interview?</a:t>
-            </a:r>
-          </a:p>
-          <a:p>
-            <a:r>
-              <a:rPr lang="en-US" dirty="0"/>
-              <a:t>Why Change</a:t>
-            </a:r>
-          </a:p>
-          <a:p>
-            <a:r>
-              <a:rPr lang="en-US" dirty="0"/>
-              <a:t>Where to start</a:t>
-            </a:r>
-          </a:p>
-          <a:p>
-            <a:r>
-              <a:rPr lang="en-US" dirty="0"/>
-              <a:t>Prepare, Prepare, Prepare</a:t>
-            </a:r>
-          </a:p>
-          <a:p>
-            <a:r>
-              <a:rPr lang="en-US" dirty="0"/>
-              <a:t>Remote work?!?</a:t>
-            </a:r>
-          </a:p>
-          <a:p>
-            <a:r>
-              <a:rPr lang="en-US" dirty="0"/>
-              <a:t>I’ll show you how to interview and a few tips and tricks to get over the interview jitters.</a:t>
-            </a:r>
-          </a:p>
-          <a:p>
-            <a:pPr lvl="1"/>
-            <a:r>
-              <a:rPr lang="en-US" dirty="0"/>
-              <a:t>Basic – Phone screen</a:t>
-            </a:r>
-          </a:p>
-          <a:p>
-            <a:pPr lvl="1"/>
-            <a:r>
-              <a:rPr lang="en-US" dirty="0"/>
-              <a:t>Technical </a:t>
-            </a:r>
-          </a:p>
-          <a:p>
-            <a:pPr lvl="1"/>
-            <a:r>
-              <a:rPr lang="en-US" dirty="0"/>
-              <a:t>Demonstrated skills</a:t>
-            </a:r>
-          </a:p>
-          <a:p>
-            <a:endParaRPr lang="en-US" dirty="0"/>
-          </a:p>
-        </p:txBody>
-      </p:sp>
+              <a:rPr lang="en-US" sz="5867" dirty="0"/>
+              <a:t>Thank you to our Global  Sponsors and Supporters</a:t>
+            </a:r>
+          </a:p>
+        </p:txBody>
+      </p:sp>
+      <p:grpSp>
+        <p:nvGrpSpPr>
+          <p:cNvPr id="12" name="Group 11">
+            <a:extLst>
+              <a:ext uri="{FF2B5EF4-FFF2-40B4-BE49-F238E27FC236}">
+                <a16:creationId xmlns:a16="http://schemas.microsoft.com/office/drawing/2014/main" id="{17461DDA-62E9-4998-955E-E68B452BF223}"/>
+              </a:ext>
+            </a:extLst>
+          </p:cNvPr>
+          <p:cNvGrpSpPr/>
+          <p:nvPr/>
+        </p:nvGrpSpPr>
+        <p:grpSpPr>
+          <a:xfrm>
+            <a:off x="6096001" y="894527"/>
+            <a:ext cx="4627404" cy="5601791"/>
+            <a:chOff x="4559900" y="828282"/>
+            <a:chExt cx="3470553" cy="4201343"/>
+          </a:xfrm>
+        </p:grpSpPr>
+        <p:pic>
+          <p:nvPicPr>
+            <p:cNvPr id="3" name="Picture 2" descr="https://eastus1-mediap.svc.ms/transform/thumbnail?provider=spo&amp;inputFormat=png&amp;cs=fFNQTw&amp;docid=https%3A%2F%2Fsqlpass365-my.sharepoint.com%3A443%2F_api%2Fv2.0%2Fdrives%2Fb!foE7roR9Jkahp1eDpbuCNzsI0q0yYmNIvCrkt06UyE68uZlao4rJQZ3tymFRSPDq%2Fitems%2F01FYQCTPJPSMVC3OMFCJH2NL2K6MN5DC4W%3Fversion%3DPublished&amp;access_token=eyJ0eXAiOiJKV1QiLCJhbGciOiJub25lIn0.eyJhdWQiOiIwMDAwMDAwMy0wMDAwLTBmZjEtY2UwMC0wMDAwMDAwMDAwMDAvc3FscGFzczM2NS1teS5zaGFyZXBvaW50LmNvbUA1Y2E3OGRlNi1iMGRjLTQwM2YtOWQzYy1lZmUwMmM4ZDZjMzciLCJpc3MiOiIwMDAwMDAwMy0wMDAwLTBmZjEtY2UwMC0wMDAwMDAwMDAwMDAiLCJuYmYiOiIxNTcwMjExMjc5IiwiZXhwIjoiMTU3MDIzMjg3OSIsImVuZHBvaW50dXJsIjoiQ3ZOTEVwQysyVlBlSmp3K2laaXlDSVZhS2ErOU1DeVNrM3d4dUxmcVVpMD0iLCJlbmRwb2ludHVybExlbmd0aCI6IjEyMCIsImlzbG9vcGJhY2siOiJUcnVlIiwiY2lkIjoiWmpoaE1EQmhPV1l0T1RBNVpTMDVNREF3TFRaaE5EQXRZek16TXpBNVlqY3pNV1kyIiwidmVyIjoiaGFzaGVkcHJvb2Z0b2tlbiIsInNpdGVpZCI6IllXVXpZamd4TjJVdE4yUTROQzAwTmpJMkxXRXhZVGN0TlRjNE0yRTFZbUk0TWpNMyIsInNpZ25pbl9zdGF0ZSI6IltcImttc2lcIl0iLCJuYW1laWQiOiIwIy5mfG1lbWJlcnNoaXB8YW1hbmRhLm1hcnRpbkBwYXNzLm9yZyIsIm5paSI6Im1pY3Jvc29mdC5zaGFyZXBvaW50IiwiaXN1c2VyIjoidHJ1ZSIsImNhY2hla2V5IjoiMGguZnxtZW1iZXJzaGlwfDEwMDM3ZmZlOWI3MjU0ZDRAbGl2ZS5jb20iLCJ0dCI6IjAiLCJ1c2VQZXJzaXN0ZW50Q29va2llIjoiMyJ9.V2RaL0FWdjZucU9ldG5SWm1aSVU5RUh5eXB3WDh2STFMREN1ZXJTQmZqZz0&amp;encodeFailures=1&amp;srcWidth=&amp;srcHeight=&amp;width=440&amp;height=71&amp;action=Access">
+              <a:extLst>
+                <a:ext uri="{FF2B5EF4-FFF2-40B4-BE49-F238E27FC236}">
+                  <a16:creationId xmlns:a16="http://schemas.microsoft.com/office/drawing/2014/main" id="{1791629B-37C7-4B07-ABBE-6FD96008092B}"/>
+                </a:ext>
+              </a:extLst>
+            </p:cNvPr>
+            <p:cNvPicPr>
+              <a:picLocks noChangeAspect="1" noChangeArrowheads="1"/>
+            </p:cNvPicPr>
+            <p:nvPr/>
+          </p:nvPicPr>
+          <p:blipFill>
+            <a:blip r:embed="rId2">
+              <a:extLst>
+                <a:ext uri="{28A0092B-C50C-407E-A947-70E740481C1C}">
+                  <a14:useLocalDpi xmlns:a14="http://schemas.microsoft.com/office/drawing/2010/main" val="0"/>
+                </a:ext>
+              </a:extLst>
+            </a:blip>
+            <a:srcRect/>
+            <a:stretch>
+              <a:fillRect/>
+            </a:stretch>
+          </p:blipFill>
+          <p:spPr bwMode="auto">
+            <a:xfrm>
+              <a:off x="4559900" y="828282"/>
+              <a:ext cx="3470553" cy="560021"/>
+            </a:xfrm>
+            <a:prstGeom prst="rect">
+              <a:avLst/>
+            </a:prstGeom>
+            <a:noFill/>
+            <a:extLst>
+              <a:ext uri="{909E8E84-426E-40DD-AFC4-6F175D3DCCD1}">
+                <a14:hiddenFill xmlns:a14="http://schemas.microsoft.com/office/drawing/2010/main">
+                  <a:solidFill>
+                    <a:srgbClr val="FFFFFF"/>
+                  </a:solidFill>
+                </a14:hiddenFill>
+              </a:ext>
+            </a:extLst>
+          </p:spPr>
+        </p:pic>
+        <p:pic>
+          <p:nvPicPr>
+            <p:cNvPr id="8" name="Picture 10">
+              <a:extLst>
+                <a:ext uri="{FF2B5EF4-FFF2-40B4-BE49-F238E27FC236}">
+                  <a16:creationId xmlns:a16="http://schemas.microsoft.com/office/drawing/2014/main" id="{1DD9CA24-5D60-4C70-9AE5-E7C83B94BF2D}"/>
+                </a:ext>
+              </a:extLst>
+            </p:cNvPr>
+            <p:cNvPicPr>
+              <a:picLocks noChangeAspect="1" noChangeArrowheads="1"/>
+            </p:cNvPicPr>
+            <p:nvPr/>
+          </p:nvPicPr>
+          <p:blipFill>
+            <a:blip r:embed="rId3" cstate="print">
+              <a:extLst>
+                <a:ext uri="{28A0092B-C50C-407E-A947-70E740481C1C}">
+                  <a14:useLocalDpi xmlns:a14="http://schemas.microsoft.com/office/drawing/2010/main" val="0"/>
+                </a:ext>
+              </a:extLst>
+            </a:blip>
+            <a:stretch>
+              <a:fillRect/>
+            </a:stretch>
+          </p:blipFill>
+          <p:spPr bwMode="auto">
+            <a:xfrm>
+              <a:off x="5246026" y="1703076"/>
+              <a:ext cx="2150078" cy="275559"/>
+            </a:xfrm>
+            <a:prstGeom prst="rect">
+              <a:avLst/>
+            </a:prstGeom>
+            <a:noFill/>
+            <a:extLst>
+              <a:ext uri="{909E8E84-426E-40DD-AFC4-6F175D3DCCD1}">
+                <a14:hiddenFill xmlns:a14="http://schemas.microsoft.com/office/drawing/2010/main">
+                  <a:solidFill>
+                    <a:srgbClr val="FFFFFF"/>
+                  </a:solidFill>
+                </a14:hiddenFill>
+              </a:ext>
+            </a:extLst>
+          </p:spPr>
+        </p:pic>
+        <p:grpSp>
+          <p:nvGrpSpPr>
+            <p:cNvPr id="9" name="Group 8">
+              <a:extLst>
+                <a:ext uri="{FF2B5EF4-FFF2-40B4-BE49-F238E27FC236}">
+                  <a16:creationId xmlns:a16="http://schemas.microsoft.com/office/drawing/2014/main" id="{3E1466FE-8A1E-43A2-8C8B-41D40FEB7EF6}"/>
+                </a:ext>
+              </a:extLst>
+            </p:cNvPr>
+            <p:cNvGrpSpPr/>
+            <p:nvPr/>
+          </p:nvGrpSpPr>
+          <p:grpSpPr>
+            <a:xfrm>
+              <a:off x="5441587" y="2918785"/>
+              <a:ext cx="1758955" cy="2110840"/>
+              <a:chOff x="5402702" y="2376242"/>
+              <a:chExt cx="1758955" cy="2110840"/>
+            </a:xfrm>
+          </p:grpSpPr>
+          <p:pic>
+            <p:nvPicPr>
+              <p:cNvPr id="10" name="Picture 9">
+                <a:extLst>
+                  <a:ext uri="{FF2B5EF4-FFF2-40B4-BE49-F238E27FC236}">
+                    <a16:creationId xmlns:a16="http://schemas.microsoft.com/office/drawing/2014/main" id="{64CF7DAB-2BFA-4906-8579-534482BB8A52}"/>
+                  </a:ext>
+                </a:extLst>
+              </p:cNvPr>
+              <p:cNvPicPr>
+                <a:picLocks noChangeAspect="1"/>
+              </p:cNvPicPr>
+              <p:nvPr/>
+            </p:nvPicPr>
+            <p:blipFill>
+              <a:blip r:embed="rId4">
+                <a:extLst>
+                  <a:ext uri="{28A0092B-C50C-407E-A947-70E740481C1C}">
+                    <a14:useLocalDpi xmlns:a14="http://schemas.microsoft.com/office/drawing/2010/main"/>
+                  </a:ext>
+                </a:extLst>
+              </a:blip>
+              <a:stretch>
+                <a:fillRect/>
+              </a:stretch>
+            </p:blipFill>
+            <p:spPr>
+              <a:xfrm>
+                <a:off x="5692629" y="2912533"/>
+                <a:ext cx="1147344" cy="314152"/>
+              </a:xfrm>
+              <a:prstGeom prst="rect">
+                <a:avLst/>
+              </a:prstGeom>
+            </p:spPr>
+          </p:pic>
+          <p:pic>
+            <p:nvPicPr>
+              <p:cNvPr id="11" name="Picture 12" descr="https://eastus1-mediap.svc.ms/transform/thumbnail?provider=spo&amp;inputFormat=png&amp;cs=fFNQTw&amp;docid=https%3A%2F%2Fsqlpass365-my.sharepoint.com%3A443%2F_api%2Fv2.0%2Fdrives%2Fb!foE7roR9Jkahp1eDpbuCNzsI0q0yYmNIvCrkt06UyE68uZlao4rJQZ3tymFRSPDq%2Fitems%2F01FYQCTPJC63LHZ3GD7BD2XM6MT4HCLZPK%3Fversion%3DPublished&amp;access_token=eyJ0eXAiOiJKV1QiLCJhbGciOiJub25lIn0.eyJhdWQiOiIwMDAwMDAwMy0wMDAwLTBmZjEtY2UwMC0wMDAwMDAwMDAwMDAvc3FscGFzczM2NS1teS5zaGFyZXBvaW50LmNvbUA1Y2E3OGRlNi1iMGRjLTQwM2YtOWQzYy1lZmUwMmM4ZDZjMzciLCJpc3MiOiIwMDAwMDAwMy0wMDAwLTBmZjEtY2UwMC0wMDAwMDAwMDAwMDAiLCJuYmYiOiIxNTcwMjExMjc5IiwiZXhwIjoiMTU3MDIzMjg3OSIsImVuZHBvaW50dXJsIjoiQ3ZOTEVwQysyVlBlSmp3K2laaXlDSVZhS2ErOU1DeVNrM3d4dUxmcVVpMD0iLCJlbmRwb2ludHVybExlbmd0aCI6IjEyMCIsImlzbG9vcGJhY2siOiJUcnVlIiwiY2lkIjoiWmpoaE1EQmhPV1l0T1RBNVpTMDVNREF3TFRaaE5EQXRZek16TXpBNVlqY3pNV1kyIiwidmVyIjoiaGFzaGVkcHJvb2Z0b2tlbiIsInNpdGVpZCI6IllXVXpZamd4TjJVdE4yUTROQzAwTmpJMkxXRXhZVGN0TlRjNE0yRTFZbUk0TWpNMyIsInNpZ25pbl9zdGF0ZSI6IltcImttc2lcIl0iLCJuYW1laWQiOiIwIy5mfG1lbWJlcnNoaXB8YW1hbmRhLm1hcnRpbkBwYXNzLm9yZyIsIm5paSI6Im1pY3Jvc29mdC5zaGFyZXBvaW50IiwiaXN1c2VyIjoidHJ1ZSIsImNhY2hla2V5IjoiMGguZnxtZW1iZXJzaGlwfDEwMDM3ZmZlOWI3MjU0ZDRAbGl2ZS5jb20iLCJ0dCI6IjAiLCJ1c2VQZXJzaXN0ZW50Q29va2llIjoiMyJ9.V2RaL0FWdjZucU9ldG5SWm1aSVU5RUh5eXB3WDh2STFMREN1ZXJTQmZqZz0&amp;encodeFailures=1&amp;srcWidth=&amp;srcHeight=&amp;width=910&amp;height=98&amp;action=Access">
+                <a:extLst>
+                  <a:ext uri="{FF2B5EF4-FFF2-40B4-BE49-F238E27FC236}">
+                    <a16:creationId xmlns:a16="http://schemas.microsoft.com/office/drawing/2014/main" id="{7F604818-48BB-4AC4-B0F4-E6B5FE41815A}"/>
+                  </a:ext>
+                </a:extLst>
+              </p:cNvPr>
+              <p:cNvPicPr>
+                <a:picLocks noChangeAspect="1" noChangeArrowheads="1"/>
+              </p:cNvPicPr>
+              <p:nvPr/>
+            </p:nvPicPr>
+            <p:blipFill>
+              <a:blip r:embed="rId5" cstate="print">
+                <a:extLst>
+                  <a:ext uri="{28A0092B-C50C-407E-A947-70E740481C1C}">
+                    <a14:useLocalDpi xmlns:a14="http://schemas.microsoft.com/office/drawing/2010/main" val="0"/>
+                  </a:ext>
+                </a:extLst>
+              </a:blip>
+              <a:srcRect/>
+              <a:stretch>
+                <a:fillRect/>
+              </a:stretch>
+            </p:blipFill>
+            <p:spPr bwMode="auto">
+              <a:xfrm>
+                <a:off x="5480473" y="2376242"/>
+                <a:ext cx="1681184" cy="181051"/>
+              </a:xfrm>
+              <a:prstGeom prst="rect">
+                <a:avLst/>
+              </a:prstGeom>
+              <a:noFill/>
+              <a:extLst>
+                <a:ext uri="{909E8E84-426E-40DD-AFC4-6F175D3DCCD1}">
+                  <a14:hiddenFill xmlns:a14="http://schemas.microsoft.com/office/drawing/2010/main">
+                    <a:solidFill>
+                      <a:srgbClr val="FFFFFF"/>
+                    </a:solidFill>
+                  </a14:hiddenFill>
+                </a:ext>
+              </a:extLst>
+            </p:spPr>
+          </p:pic>
+          <p:pic>
+            <p:nvPicPr>
+              <p:cNvPr id="17" name="Picture 16">
+                <a:extLst>
+                  <a:ext uri="{FF2B5EF4-FFF2-40B4-BE49-F238E27FC236}">
+                    <a16:creationId xmlns:a16="http://schemas.microsoft.com/office/drawing/2014/main" id="{FCD31613-1C2D-4286-B2C9-72039F411849}"/>
+                  </a:ext>
+                </a:extLst>
+              </p:cNvPr>
+              <p:cNvPicPr>
+                <a:picLocks noChangeAspect="1"/>
+              </p:cNvPicPr>
+              <p:nvPr/>
+            </p:nvPicPr>
+            <p:blipFill>
+              <a:blip r:embed="rId6">
+                <a:extLst>
+                  <a:ext uri="{28A0092B-C50C-407E-A947-70E740481C1C}">
+                    <a14:useLocalDpi xmlns:a14="http://schemas.microsoft.com/office/drawing/2010/main" val="0"/>
+                  </a:ext>
+                </a:extLst>
+              </a:blip>
+              <a:stretch>
+                <a:fillRect/>
+              </a:stretch>
+            </p:blipFill>
+            <p:spPr>
+              <a:xfrm>
+                <a:off x="5603401" y="4276360"/>
+                <a:ext cx="1325800" cy="210722"/>
+              </a:xfrm>
+              <a:prstGeom prst="rect">
+                <a:avLst/>
+              </a:prstGeom>
+            </p:spPr>
+          </p:pic>
+          <p:pic>
+            <p:nvPicPr>
+              <p:cNvPr id="21" name="Picture 20">
+                <a:extLst>
+                  <a:ext uri="{FF2B5EF4-FFF2-40B4-BE49-F238E27FC236}">
+                    <a16:creationId xmlns:a16="http://schemas.microsoft.com/office/drawing/2014/main" id="{A490B0D2-043F-4B2E-BFC3-8F761509CF89}"/>
+                  </a:ext>
+                </a:extLst>
+              </p:cNvPr>
+              <p:cNvPicPr>
+                <a:picLocks noChangeAspect="1"/>
+              </p:cNvPicPr>
+              <p:nvPr/>
+            </p:nvPicPr>
+            <p:blipFill>
+              <a:blip r:embed="rId7">
+                <a:extLst>
+                  <a:ext uri="{28A0092B-C50C-407E-A947-70E740481C1C}">
+                    <a14:useLocalDpi xmlns:a14="http://schemas.microsoft.com/office/drawing/2010/main" val="0"/>
+                  </a:ext>
+                </a:extLst>
+              </a:blip>
+              <a:stretch>
+                <a:fillRect/>
+              </a:stretch>
+            </p:blipFill>
+            <p:spPr>
+              <a:xfrm>
+                <a:off x="5402702" y="3576933"/>
+                <a:ext cx="1727198" cy="344292"/>
+              </a:xfrm>
+              <a:prstGeom prst="rect">
+                <a:avLst/>
+              </a:prstGeom>
+            </p:spPr>
+          </p:pic>
+        </p:grpSp>
+        <p:pic>
+          <p:nvPicPr>
+            <p:cNvPr id="7" name="Picture 6" descr="A picture containing drawing&#10;&#10;Description automatically generated">
+              <a:extLst>
+                <a:ext uri="{FF2B5EF4-FFF2-40B4-BE49-F238E27FC236}">
+                  <a16:creationId xmlns:a16="http://schemas.microsoft.com/office/drawing/2014/main" id="{BAD11CFB-FE3A-4A76-9FF3-56F2B929D1EB}"/>
+                </a:ext>
+              </a:extLst>
+            </p:cNvPr>
+            <p:cNvPicPr>
+              <a:picLocks noChangeAspect="1"/>
+            </p:cNvPicPr>
+            <p:nvPr/>
+          </p:nvPicPr>
+          <p:blipFill>
+            <a:blip r:embed="rId8" cstate="print">
+              <a:extLst>
+                <a:ext uri="{28A0092B-C50C-407E-A947-70E740481C1C}">
+                  <a14:useLocalDpi xmlns:a14="http://schemas.microsoft.com/office/drawing/2010/main" val="0"/>
+                </a:ext>
+              </a:extLst>
+            </a:blip>
+            <a:stretch>
+              <a:fillRect/>
+            </a:stretch>
+          </p:blipFill>
+          <p:spPr>
+            <a:xfrm>
+              <a:off x="4978988" y="2085097"/>
+              <a:ext cx="2618296" cy="687048"/>
+            </a:xfrm>
+            <a:prstGeom prst="rect">
+              <a:avLst/>
+            </a:prstGeom>
+          </p:spPr>
+        </p:pic>
+      </p:grpSp>
     </p:spTree>
     <p:extLst>
       <p:ext uri="{BB962C8B-B14F-4D97-AF65-F5344CB8AC3E}">
-        <p14:creationId xmlns:p14="http://schemas.microsoft.com/office/powerpoint/2010/main" val="1178420100"/>
+        <p14:creationId xmlns:p14="http://schemas.microsoft.com/office/powerpoint/2010/main" val="3959511670"/>
       </p:ext>
     </p:extLst>
   </p:cSld>
@@ -8199,71 +9612,155 @@
       </p:grpSpPr>
       <p:sp>
         <p:nvSpPr>
-          <p:cNvPr id="2" name="Title 1">
+          <p:cNvPr id="2" name="Rectangle 1">
             <a:extLst>
               <a:ext uri="{FF2B5EF4-FFF2-40B4-BE49-F238E27FC236}">
-                <a16:creationId xmlns:a16="http://schemas.microsoft.com/office/drawing/2014/main" id="{2A1B0321-928B-7145-B480-9A879090FE17}"/>
+                <a16:creationId xmlns:a16="http://schemas.microsoft.com/office/drawing/2014/main" id="{B9825053-76F6-4381-B09E-C54FAE03C52C}"/>
               </a:ext>
             </a:extLst>
           </p:cNvPr>
-          <p:cNvSpPr>
-            <a:spLocks noGrp="1"/>
-          </p:cNvSpPr>
-          <p:nvPr>
-            <p:ph type="title"/>
-          </p:nvPr>
-        </p:nvSpPr>
-        <p:spPr>
-          <a:xfrm>
-            <a:off x="1022892" y="2326821"/>
-            <a:ext cx="10146215" cy="2106386"/>
+          <p:cNvSpPr/>
+          <p:nvPr/>
+        </p:nvSpPr>
+        <p:spPr>
+          <a:xfrm>
+            <a:off x="381000" y="5676900"/>
+            <a:ext cx="11172603" cy="762000"/>
+          </a:xfrm>
+          <a:prstGeom prst="rect">
+            <a:avLst/>
+          </a:prstGeom>
+          <a:ln w="76200">
+            <a:solidFill>
+              <a:srgbClr val="FF0000"/>
+            </a:solidFill>
+          </a:ln>
+        </p:spPr>
+        <p:style>
+          <a:lnRef idx="2">
+            <a:schemeClr val="accent5"/>
+          </a:lnRef>
+          <a:fillRef idx="1">
+            <a:schemeClr val="lt1"/>
+          </a:fillRef>
+          <a:effectRef idx="0">
+            <a:schemeClr val="accent5"/>
+          </a:effectRef>
+          <a:fontRef idx="minor">
+            <a:schemeClr val="dk1"/>
+          </a:fontRef>
+        </p:style>
+        <p:txBody>
+          <a:bodyPr rtlCol="0" anchor="ctr"/>
+          <a:lstStyle/>
+          <a:p>
+            <a:pPr algn="ctr"/>
+            <a:endParaRPr lang="en-US"/>
+          </a:p>
+        </p:txBody>
+      </p:sp>
+      <p:sp>
+        <p:nvSpPr>
+          <p:cNvPr id="4" name="Text Placeholder 3">
+            <a:extLst>
+              <a:ext uri="{FF2B5EF4-FFF2-40B4-BE49-F238E27FC236}">
+                <a16:creationId xmlns:a16="http://schemas.microsoft.com/office/drawing/2014/main" id="{C91A1E2D-9DF4-4F83-9D90-D879C6C833D3}"/>
+              </a:ext>
+            </a:extLst>
+          </p:cNvPr>
+          <p:cNvSpPr>
+            <a:spLocks noGrp="1"/>
+          </p:cNvSpPr>
+          <p:nvPr>
+            <p:ph type="body" sz="quarter" idx="21"/>
+          </p:nvPr>
+        </p:nvSpPr>
+        <p:spPr>
+          <a:xfrm>
+            <a:off x="552672" y="4170368"/>
+            <a:ext cx="11172603" cy="2195227"/>
           </a:xfrm>
         </p:spPr>
         <p:txBody>
           <a:bodyPr>
-            <a:normAutofit/>
+            <a:normAutofit fontScale="92500" lnSpcReduction="10000"/>
           </a:bodyPr>
           <a:lstStyle/>
           <a:p>
-            <a:pPr algn="ctr"/>
-            <a:r>
-              <a:rPr lang="en-US" sz="2400" dirty="0">
-                <a:hlinkClick r:id="rId2"/>
+            <a:pPr fontAlgn="base"/>
+            <a:r>
+              <a:rPr lang="en-US" sz="1867" dirty="0"/>
+              <a:t>We are thrilled to say the first ever PASS Virtual Summit will be taking place this November! </a:t>
+            </a:r>
+          </a:p>
+          <a:p>
+            <a:pPr fontAlgn="base"/>
+            <a:endParaRPr lang="en-US" sz="1867" dirty="0"/>
+          </a:p>
+          <a:p>
+            <a:pPr fontAlgn="base"/>
+            <a:r>
+              <a:rPr lang="en-US" sz="1867" dirty="0"/>
+              <a:t>We will be launching PASS Summit into a whole new world, and with that comes exciting opportunities with what we can offer you. We will go beyond simply moving sessions online to fully embracing everything a virtual environment can offer. </a:t>
+            </a:r>
+            <a:br>
+              <a:rPr lang="en-US" sz="1867" dirty="0"/>
+            </a:br>
+            <a:endParaRPr lang="en-US" sz="1867" dirty="0"/>
+          </a:p>
+          <a:p>
+            <a:pPr fontAlgn="base"/>
+            <a:r>
+              <a:rPr lang="en-US" sz="1867" b="1" dirty="0">
+                <a:solidFill>
+                  <a:srgbClr val="C00000"/>
+                </a:solidFill>
               </a:rPr>
-              <a:t>https://github.com/SQLFitness/InterviewingForADBAJob</a:t>
-            </a:r>
-            <a:br>
-              <a:rPr lang="en-US" sz="2400" dirty="0"/>
-            </a:br>
-            <a:br>
-              <a:rPr lang="en-US" sz="2400" dirty="0"/>
-            </a:br>
-            <a:r>
-              <a:rPr lang="en-US" sz="2400" dirty="0">
-                <a:hlinkClick r:id="rId3"/>
-              </a:rPr>
-              <a:t>https://www.linkedin.com/in/drblind/</a:t>
-            </a:r>
-            <a:br>
-              <a:rPr lang="en-US" sz="2400" dirty="0"/>
-            </a:br>
-            <a:br>
-              <a:rPr lang="en-US" sz="2400" dirty="0"/>
-            </a:br>
-            <a:r>
-              <a:rPr lang="en-US" sz="2400" dirty="0">
-                <a:hlinkClick r:id="rId4"/>
-              </a:rPr>
-              <a:t>https://twitter.com/SQLFitness</a:t>
-            </a:r>
-            <a:endParaRPr lang="en-US" sz="2400" dirty="0"/>
-          </a:p>
-        </p:txBody>
-      </p:sp>
+              <a:t>Find out more at PASS.org/summit  - Utah County SQL Group discount code - LGDIS6I0T ($50 off registration)</a:t>
+            </a:r>
+          </a:p>
+        </p:txBody>
+      </p:sp>
+      <p:pic>
+        <p:nvPicPr>
+          <p:cNvPr id="3" name="Picture 2" descr="A close up of a person&#10;&#10;Description automatically generated">
+            <a:extLst>
+              <a:ext uri="{FF2B5EF4-FFF2-40B4-BE49-F238E27FC236}">
+                <a16:creationId xmlns:a16="http://schemas.microsoft.com/office/drawing/2014/main" id="{D6612586-467F-428A-BAFC-EAC118617A00}"/>
+              </a:ext>
+            </a:extLst>
+          </p:cNvPr>
+          <p:cNvPicPr>
+            <a:picLocks noChangeAspect="1"/>
+          </p:cNvPicPr>
+          <p:nvPr/>
+        </p:nvPicPr>
+        <p:blipFill>
+          <a:blip r:embed="rId2">
+            <a:extLst>
+              <a:ext uri="{28A0092B-C50C-407E-A947-70E740481C1C}">
+                <a14:useLocalDpi xmlns:a14="http://schemas.microsoft.com/office/drawing/2010/main" val="0"/>
+              </a:ext>
+            </a:extLst>
+          </a:blip>
+          <a:stretch>
+            <a:fillRect/>
+          </a:stretch>
+        </p:blipFill>
+        <p:spPr>
+          <a:xfrm>
+            <a:off x="0" y="3699"/>
+            <a:ext cx="12192000" cy="3822700"/>
+          </a:xfrm>
+          <a:prstGeom prst="rect">
+            <a:avLst/>
+          </a:prstGeom>
+        </p:spPr>
+      </p:pic>
     </p:spTree>
     <p:extLst>
       <p:ext uri="{BB962C8B-B14F-4D97-AF65-F5344CB8AC3E}">
-        <p14:creationId xmlns:p14="http://schemas.microsoft.com/office/powerpoint/2010/main" val="4092099928"/>
+        <p14:creationId xmlns:p14="http://schemas.microsoft.com/office/powerpoint/2010/main" val="1952382902"/>
       </p:ext>
     </p:extLst>
   </p:cSld>
@@ -8306,12 +9803,8 @@
           <a:lstStyle/>
           <a:p>
             <a:r>
-              <a:rPr lang="en-US" dirty="0"/>
-              <a:t>Why</a:t>
-            </a:r>
-            <a:r>
-              <a:rPr lang="en-US" baseline="0" dirty="0"/>
-              <a:t> change</a:t>
+              <a:rPr lang="en-US"/>
+              <a:t>Agenda</a:t>
             </a:r>
             <a:endParaRPr lang="en-US" dirty="0"/>
           </a:p>
@@ -8327,59 +9820,80 @@
             <p:ph idx="1"/>
           </p:nvPr>
         </p:nvSpPr>
-        <p:spPr/>
-        <p:txBody>
-          <a:bodyPr/>
-          <a:lstStyle/>
-          <a:p>
-            <a:r>
-              <a:rPr lang="en-US" dirty="0"/>
-              <a:t>Something happened</a:t>
-            </a:r>
-          </a:p>
-          <a:p>
-            <a:r>
-              <a:rPr lang="en-US" dirty="0"/>
-              <a:t>Someone</a:t>
-            </a:r>
-            <a:r>
-              <a:rPr lang="en-US" baseline="0" dirty="0"/>
-              <a:t> did</a:t>
-            </a:r>
-            <a:r>
-              <a:rPr lang="en-US" dirty="0"/>
-              <a:t> something I don’t want to deal with*</a:t>
-            </a:r>
-            <a:endParaRPr lang="en-US" baseline="0" dirty="0"/>
-          </a:p>
-          <a:p>
-            <a:r>
-              <a:rPr lang="en-US" baseline="0" dirty="0"/>
-              <a:t>“I’ve finally had enough…!”</a:t>
-            </a:r>
-          </a:p>
-          <a:p>
-            <a:r>
-              <a:rPr lang="en-US" baseline="0" dirty="0"/>
-              <a:t>Nobody likes me…</a:t>
-            </a:r>
-          </a:p>
-          <a:p>
-            <a:r>
-              <a:rPr lang="en-US" baseline="0" dirty="0"/>
-              <a:t>Nobody cares…</a:t>
-            </a:r>
-          </a:p>
-          <a:p>
-            <a:r>
-              <a:rPr lang="en-US" baseline="0" dirty="0"/>
-              <a:t>I’m Loyal but…</a:t>
-            </a:r>
-          </a:p>
-          <a:p>
-            <a:r>
-              <a:rPr lang="en-US" baseline="0" dirty="0"/>
-              <a:t>MONEY</a:t>
+        <p:spPr>
+          <a:xfrm>
+            <a:off x="515815" y="2194562"/>
+            <a:ext cx="10990385" cy="4024125"/>
+          </a:xfrm>
+        </p:spPr>
+        <p:txBody>
+          <a:bodyPr>
+            <a:normAutofit/>
+          </a:bodyPr>
+          <a:lstStyle/>
+          <a:p>
+            <a:r>
+              <a:rPr lang="en-US" dirty="0"/>
+              <a:t>We are really </a:t>
+            </a:r>
+            <a:r>
+              <a:rPr lang="en-US" i="1" dirty="0"/>
+              <a:t>really</a:t>
+            </a:r>
+            <a:r>
+              <a:rPr lang="en-US" dirty="0"/>
+              <a:t> smart, but can we show our best side when we interview?</a:t>
+            </a:r>
+          </a:p>
+          <a:p>
+            <a:r>
+              <a:rPr lang="en-US" dirty="0"/>
+              <a:t>Why Change</a:t>
+            </a:r>
+          </a:p>
+          <a:p>
+            <a:r>
+              <a:rPr lang="en-US" dirty="0"/>
+              <a:t>Where to start</a:t>
+            </a:r>
+          </a:p>
+          <a:p>
+            <a:r>
+              <a:rPr lang="en-US" dirty="0"/>
+              <a:t>Prepare, Prepare, Prepare</a:t>
+            </a:r>
+          </a:p>
+          <a:p>
+            <a:r>
+              <a:rPr lang="en-US" dirty="0"/>
+              <a:t>Remote work?!?</a:t>
+            </a:r>
+          </a:p>
+          <a:p>
+            <a:r>
+              <a:rPr lang="en-US" dirty="0"/>
+              <a:t>I’ll show you how to interview and a few tips and tricks to get over the interview jitters.</a:t>
+            </a:r>
+          </a:p>
+          <a:p>
+            <a:pPr lvl="1"/>
+            <a:r>
+              <a:rPr lang="en-US" dirty="0"/>
+              <a:t>Basic – Phone screen</a:t>
+            </a:r>
+          </a:p>
+          <a:p>
+            <a:pPr lvl="1"/>
+            <a:r>
+              <a:rPr lang="en-US" dirty="0"/>
+              <a:t>Technical </a:t>
+            </a:r>
+          </a:p>
+          <a:p>
+            <a:pPr lvl="1"/>
+            <a:r>
+              <a:rPr lang="en-US" dirty="0"/>
+              <a:t>Demonstrated skills</a:t>
             </a:r>
           </a:p>
           <a:p>
@@ -8390,7 +9904,7 @@
     </p:spTree>
     <p:extLst>
       <p:ext uri="{BB962C8B-B14F-4D97-AF65-F5344CB8AC3E}">
-        <p14:creationId xmlns:p14="http://schemas.microsoft.com/office/powerpoint/2010/main" val="1785460044"/>
+        <p14:creationId xmlns:p14="http://schemas.microsoft.com/office/powerpoint/2010/main" val="1178420100"/>
       </p:ext>
     </p:extLst>
   </p:cSld>
@@ -8419,7 +9933,13 @@
       </p:grpSpPr>
       <p:sp>
         <p:nvSpPr>
-          <p:cNvPr id="2" name="Title 1"/>
+          <p:cNvPr id="2" name="Title 1">
+            <a:extLst>
+              <a:ext uri="{FF2B5EF4-FFF2-40B4-BE49-F238E27FC236}">
+                <a16:creationId xmlns:a16="http://schemas.microsoft.com/office/drawing/2014/main" id="{2A1B0321-928B-7145-B480-9A879090FE17}"/>
+              </a:ext>
+            </a:extLst>
+          </p:cNvPr>
           <p:cNvSpPr>
             <a:spLocks noGrp="1"/>
           </p:cNvSpPr>
@@ -8427,83 +9947,57 @@
             <p:ph type="title"/>
           </p:nvPr>
         </p:nvSpPr>
-        <p:spPr/>
-        <p:txBody>
-          <a:bodyPr/>
-          <a:lstStyle/>
-          <a:p>
-            <a:r>
-              <a:rPr lang="en-US" dirty="0"/>
-              <a:t>Where</a:t>
-            </a:r>
-            <a:r>
-              <a:rPr lang="en-US" baseline="0" dirty="0"/>
-              <a:t> do you start</a:t>
-            </a:r>
-            <a:endParaRPr lang="en-US" dirty="0"/>
-          </a:p>
-        </p:txBody>
-      </p:sp>
-      <p:sp>
-        <p:nvSpPr>
-          <p:cNvPr id="3" name="Content Placeholder 2"/>
-          <p:cNvSpPr>
-            <a:spLocks noGrp="1"/>
-          </p:cNvSpPr>
-          <p:nvPr>
-            <p:ph idx="1"/>
-          </p:nvPr>
-        </p:nvSpPr>
-        <p:spPr/>
-        <p:txBody>
-          <a:bodyPr/>
-          <a:lstStyle/>
-          <a:p>
-            <a:r>
-              <a:rPr lang="en-US" dirty="0"/>
-              <a:t>Resume &amp; Cover Letter</a:t>
-            </a:r>
-          </a:p>
-          <a:p>
-            <a:r>
-              <a:rPr lang="en-US" dirty="0"/>
-              <a:t>Job Requirements Review - DEMO</a:t>
-            </a:r>
-          </a:p>
-          <a:p>
-            <a:r>
-              <a:rPr lang="en-US" dirty="0"/>
-              <a:t>When</a:t>
-            </a:r>
-            <a:r>
-              <a:rPr lang="en-US" baseline="0" dirty="0"/>
-              <a:t> to be up-front with your current gig</a:t>
-            </a:r>
-          </a:p>
-          <a:p>
-            <a:r>
-              <a:rPr lang="en-US" dirty="0"/>
-              <a:t>Job board</a:t>
-            </a:r>
-          </a:p>
-          <a:p>
-            <a:r>
-              <a:rPr lang="en-US" dirty="0"/>
-              <a:t>New technology </a:t>
-            </a:r>
-          </a:p>
-          <a:p>
-            <a:endParaRPr lang="en-US" dirty="0"/>
-          </a:p>
-          <a:p>
-            <a:endParaRPr lang="en-US" dirty="0"/>
+        <p:spPr>
+          <a:xfrm>
+            <a:off x="1022892" y="2326821"/>
+            <a:ext cx="10146215" cy="2106386"/>
+          </a:xfrm>
+        </p:spPr>
+        <p:txBody>
+          <a:bodyPr>
+            <a:normAutofit/>
+          </a:bodyPr>
+          <a:lstStyle/>
+          <a:p>
+            <a:pPr algn="ctr"/>
+            <a:r>
+              <a:rPr lang="en-US" sz="2400" dirty="0">
+                <a:hlinkClick r:id="rId3"/>
+              </a:rPr>
+              <a:t>https://github.com/SQLFitness/InterviewingForADBAJob</a:t>
+            </a:r>
+            <a:br>
+              <a:rPr lang="en-US" sz="2400" dirty="0"/>
+            </a:br>
+            <a:br>
+              <a:rPr lang="en-US" sz="2400" dirty="0"/>
+            </a:br>
+            <a:r>
+              <a:rPr lang="en-US" sz="2400" dirty="0">
+                <a:hlinkClick r:id="rId4"/>
+              </a:rPr>
+              <a:t>https://www.linkedin.com/in/drblind/</a:t>
+            </a:r>
+            <a:br>
+              <a:rPr lang="en-US" sz="2400" dirty="0"/>
+            </a:br>
+            <a:br>
+              <a:rPr lang="en-US" sz="2400" dirty="0"/>
+            </a:br>
+            <a:r>
+              <a:rPr lang="en-US" sz="2400" dirty="0">
+                <a:hlinkClick r:id="rId5"/>
+              </a:rPr>
+              <a:t>https://twitter.com/SQLFitness</a:t>
+            </a:r>
+            <a:endParaRPr lang="en-US" sz="2400" dirty="0"/>
           </a:p>
         </p:txBody>
       </p:sp>
     </p:spTree>
     <p:extLst>
       <p:ext uri="{BB962C8B-B14F-4D97-AF65-F5344CB8AC3E}">
-        <p14:creationId xmlns:p14="http://schemas.microsoft.com/office/powerpoint/2010/main" val="2560412959"/>
+        <p14:creationId xmlns:p14="http://schemas.microsoft.com/office/powerpoint/2010/main" val="4092099928"/>
       </p:ext>
     </p:extLst>
   </p:cSld>
@@ -8547,8 +10041,13 @@
           <a:p>
             <a:r>
               <a:rPr lang="en-US" dirty="0"/>
-              <a:t>Prepare, prepare, Prepare </a:t>
-            </a:r>
+              <a:t>Why</a:t>
+            </a:r>
+            <a:r>
+              <a:rPr lang="en-US" baseline="0" dirty="0"/>
+              <a:t> change</a:t>
+            </a:r>
+            <a:endParaRPr lang="en-US" dirty="0"/>
           </a:p>
         </p:txBody>
       </p:sp>
@@ -8569,46 +10068,55 @@
           <a:p>
             <a:r>
               <a:rPr lang="en-US" dirty="0"/>
-              <a:t>Find out about the company</a:t>
-            </a:r>
-          </a:p>
-          <a:p>
-            <a:r>
-              <a:rPr lang="en-US" dirty="0"/>
-              <a:t>Read about the companies culture on their website.</a:t>
-            </a:r>
-          </a:p>
-          <a:p>
-            <a:r>
-              <a:rPr lang="en-US" dirty="0"/>
-              <a:t>See what perks they offer</a:t>
-            </a:r>
-          </a:p>
-          <a:p>
-            <a:pPr lvl="1"/>
-            <a:r>
-              <a:rPr lang="en-US" dirty="0"/>
-              <a:t>Ask questions about the “perks” to </a:t>
-            </a:r>
-            <a:r>
-              <a:rPr lang="en-US" u="sng" dirty="0"/>
-              <a:t>every person</a:t>
-            </a:r>
-            <a:r>
-              <a:rPr lang="en-US" dirty="0"/>
-              <a:t> who interviews you.</a:t>
-            </a:r>
-          </a:p>
-          <a:p>
-            <a:r>
-              <a:rPr lang="en-US" dirty="0"/>
-              <a:t>Try to find out about people you may be interview with</a:t>
-            </a:r>
-          </a:p>
-          <a:p>
-            <a:pPr marL="0" indent="0">
-              <a:buNone/>
-            </a:pPr>
+              <a:t>Something happened</a:t>
+            </a:r>
+          </a:p>
+          <a:p>
+            <a:r>
+              <a:rPr lang="en-US" dirty="0"/>
+              <a:t>Someone</a:t>
+            </a:r>
+            <a:r>
+              <a:rPr lang="en-US" baseline="0" dirty="0"/>
+              <a:t> did</a:t>
+            </a:r>
+            <a:r>
+              <a:rPr lang="en-US" dirty="0"/>
+              <a:t> something I don’t want to deal with*</a:t>
+            </a:r>
+            <a:endParaRPr lang="en-US" baseline="0" dirty="0"/>
+          </a:p>
+          <a:p>
+            <a:r>
+              <a:rPr lang="en-US" baseline="0" dirty="0"/>
+              <a:t>“I’ve finally had enough…!”</a:t>
+            </a:r>
+          </a:p>
+          <a:p>
+            <a:r>
+              <a:rPr lang="en-US" baseline="0" dirty="0"/>
+              <a:t>Nobody likes me…</a:t>
+            </a:r>
+          </a:p>
+          <a:p>
+            <a:r>
+              <a:rPr lang="en-US" baseline="0" dirty="0"/>
+              <a:t>Nobody cares…</a:t>
+            </a:r>
+          </a:p>
+          <a:p>
+            <a:r>
+              <a:rPr lang="en-US" baseline="0" dirty="0"/>
+              <a:t>I’m Loyal but…</a:t>
+            </a:r>
+          </a:p>
+          <a:p>
+            <a:r>
+              <a:rPr lang="en-US" baseline="0" dirty="0"/>
+              <a:t>MONEY</a:t>
+            </a:r>
+          </a:p>
+          <a:p>
             <a:endParaRPr lang="en-US" dirty="0"/>
           </a:p>
         </p:txBody>
@@ -8616,7 +10124,7 @@
     </p:spTree>
     <p:extLst>
       <p:ext uri="{BB962C8B-B14F-4D97-AF65-F5344CB8AC3E}">
-        <p14:creationId xmlns:p14="http://schemas.microsoft.com/office/powerpoint/2010/main" val="2893273955"/>
+        <p14:creationId xmlns:p14="http://schemas.microsoft.com/office/powerpoint/2010/main" val="1785460044"/>
       </p:ext>
     </p:extLst>
   </p:cSld>
@@ -8645,13 +10153,7 @@
       </p:grpSpPr>
       <p:sp>
         <p:nvSpPr>
-          <p:cNvPr id="2" name="Title 1">
-            <a:extLst>
-              <a:ext uri="{FF2B5EF4-FFF2-40B4-BE49-F238E27FC236}">
-                <a16:creationId xmlns:a16="http://schemas.microsoft.com/office/drawing/2014/main" id="{F0E21760-9740-F84A-9E49-B689F130B1B8}"/>
-              </a:ext>
-            </a:extLst>
-          </p:cNvPr>
+          <p:cNvPr id="2" name="Title 1"/>
           <p:cNvSpPr>
             <a:spLocks noGrp="1"/>
           </p:cNvSpPr>
@@ -8666,20 +10168,19 @@
           <a:p>
             <a:r>
               <a:rPr lang="en-US" dirty="0"/>
-              <a:t>Remote Work?!?</a:t>
-            </a:r>
-          </a:p>
-        </p:txBody>
-      </p:sp>
-      <p:sp>
-        <p:nvSpPr>
-          <p:cNvPr id="3" name="Content Placeholder 2">
-            <a:extLst>
-              <a:ext uri="{FF2B5EF4-FFF2-40B4-BE49-F238E27FC236}">
-                <a16:creationId xmlns:a16="http://schemas.microsoft.com/office/drawing/2014/main" id="{B5F8AE68-B506-6B40-86D8-7A0DAFA4687B}"/>
-              </a:ext>
-            </a:extLst>
-          </p:cNvPr>
+              <a:t>Where</a:t>
+            </a:r>
+            <a:r>
+              <a:rPr lang="en-US" baseline="0" dirty="0"/>
+              <a:t> do you start</a:t>
+            </a:r>
+            <a:endParaRPr lang="en-US" dirty="0"/>
+          </a:p>
+        </p:txBody>
+      </p:sp>
+      <p:sp>
+        <p:nvSpPr>
+          <p:cNvPr id="3" name="Content Placeholder 2"/>
           <p:cNvSpPr>
             <a:spLocks noGrp="1"/>
           </p:cNvSpPr>
@@ -8694,89 +10195,49 @@
           <a:p>
             <a:r>
               <a:rPr lang="en-US" dirty="0"/>
-              <a:t>Welcome to 2020!!!</a:t>
-            </a:r>
-          </a:p>
-          <a:p>
-            <a:r>
-              <a:rPr lang="en-US" dirty="0"/>
-              <a:t>You should be able to adapt… to everything</a:t>
-            </a:r>
-          </a:p>
-          <a:p>
-            <a:r>
-              <a:rPr lang="en-US" dirty="0"/>
-              <a:t>How do you remote work</a:t>
-            </a:r>
-          </a:p>
-          <a:p>
-            <a:r>
-              <a:rPr lang="en-US" dirty="0"/>
-              <a:t>Be prepared to be on video</a:t>
-            </a:r>
-          </a:p>
-          <a:p>
-            <a:r>
-              <a:rPr lang="en-US" dirty="0"/>
-              <a:t>Install video clients before the interview</a:t>
-            </a:r>
-          </a:p>
-          <a:p>
-            <a:pPr lvl="1"/>
-            <a:r>
-              <a:rPr lang="en-US" dirty="0"/>
-              <a:t>Make sure you client is installed</a:t>
-            </a:r>
-          </a:p>
-          <a:p>
-            <a:pPr lvl="1"/>
-            <a:r>
-              <a:rPr lang="en-US" dirty="0"/>
-              <a:t>Try to use the client </a:t>
-            </a:r>
-          </a:p>
-          <a:p>
-            <a:r>
-              <a:rPr lang="en-US" dirty="0"/>
-              <a:t>Don’t be shy, but be prepared</a:t>
-            </a:r>
-          </a:p>
-        </p:txBody>
-      </p:sp>
-      <p:pic>
-        <p:nvPicPr>
-          <p:cNvPr id="5" name="Picture 4" descr="A person wearing a suit and tie&#10;&#10;Description automatically generated">
-            <a:extLst>
-              <a:ext uri="{FF2B5EF4-FFF2-40B4-BE49-F238E27FC236}">
-                <a16:creationId xmlns:a16="http://schemas.microsoft.com/office/drawing/2014/main" id="{7EACC887-53BE-EB47-99B4-AB34D9CABD30}"/>
-              </a:ext>
-            </a:extLst>
-          </p:cNvPr>
-          <p:cNvPicPr>
-            <a:picLocks noChangeAspect="1"/>
-          </p:cNvPicPr>
-          <p:nvPr/>
-        </p:nvPicPr>
-        <p:blipFill>
-          <a:blip r:embed="rId3"/>
-          <a:stretch>
-            <a:fillRect/>
-          </a:stretch>
-        </p:blipFill>
-        <p:spPr>
-          <a:xfrm>
-            <a:off x="8149045" y="1897185"/>
-            <a:ext cx="3357155" cy="4196443"/>
-          </a:xfrm>
-          <a:prstGeom prst="rect">
-            <a:avLst/>
-          </a:prstGeom>
-        </p:spPr>
-      </p:pic>
+              <a:t>Resume &amp; Cover Letter</a:t>
+            </a:r>
+          </a:p>
+          <a:p>
+            <a:r>
+              <a:rPr lang="en-US" dirty="0"/>
+              <a:t>Job Requirements Review - DEMO</a:t>
+            </a:r>
+          </a:p>
+          <a:p>
+            <a:r>
+              <a:rPr lang="en-US" dirty="0"/>
+              <a:t>When</a:t>
+            </a:r>
+            <a:r>
+              <a:rPr lang="en-US" baseline="0" dirty="0"/>
+              <a:t> to be up-front with your current gig</a:t>
+            </a:r>
+          </a:p>
+          <a:p>
+            <a:r>
+              <a:rPr lang="en-US" dirty="0"/>
+              <a:t>Job board</a:t>
+            </a:r>
+          </a:p>
+          <a:p>
+            <a:r>
+              <a:rPr lang="en-US" dirty="0"/>
+              <a:t>New technology </a:t>
+            </a:r>
+          </a:p>
+          <a:p>
+            <a:endParaRPr lang="en-US" dirty="0"/>
+          </a:p>
+          <a:p>
+            <a:endParaRPr lang="en-US" dirty="0"/>
+          </a:p>
+        </p:txBody>
+      </p:sp>
     </p:spTree>
     <p:extLst>
       <p:ext uri="{BB962C8B-B14F-4D97-AF65-F5344CB8AC3E}">
-        <p14:creationId xmlns:p14="http://schemas.microsoft.com/office/powerpoint/2010/main" val="2959983045"/>
+        <p14:creationId xmlns:p14="http://schemas.microsoft.com/office/powerpoint/2010/main" val="2560412959"/>
       </p:ext>
     </p:extLst>
   </p:cSld>
@@ -8813,19 +10274,14 @@
             <p:ph type="title"/>
           </p:nvPr>
         </p:nvSpPr>
-        <p:spPr>
-          <a:xfrm>
-            <a:off x="765109" y="764374"/>
-            <a:ext cx="10741091" cy="1293028"/>
-          </a:xfrm>
-        </p:spPr>
+        <p:spPr/>
         <p:txBody>
           <a:bodyPr/>
           <a:lstStyle/>
           <a:p>
             <a:r>
               <a:rPr lang="en-US" dirty="0"/>
-              <a:t>Basic Phone screen or first Interview </a:t>
+              <a:t>Prepare, prepare, Prepare </a:t>
             </a:r>
           </a:p>
         </p:txBody>
@@ -8847,98 +10303,54 @@
           <a:p>
             <a:r>
               <a:rPr lang="en-US" dirty="0"/>
-              <a:t>Almost</a:t>
-            </a:r>
-            <a:r>
-              <a:rPr lang="en-US" baseline="0" dirty="0"/>
-              <a:t> every “1</a:t>
-            </a:r>
-            <a:r>
-              <a:rPr lang="en-US" baseline="30000" dirty="0"/>
-              <a:t>st</a:t>
-            </a:r>
-            <a:r>
-              <a:rPr lang="en-US" baseline="0" dirty="0"/>
-              <a:t>” interview is a basic question and answer session.</a:t>
+              <a:t>Find out about the company</a:t>
+            </a:r>
+          </a:p>
+          <a:p>
+            <a:r>
+              <a:rPr lang="en-US" dirty="0"/>
+              <a:t>Read about the companies culture on their website.</a:t>
+            </a:r>
+          </a:p>
+          <a:p>
+            <a:r>
+              <a:rPr lang="en-US" dirty="0"/>
+              <a:t>See what perks they offer</a:t>
             </a:r>
           </a:p>
           <a:p>
             <a:pPr lvl="1"/>
             <a:r>
               <a:rPr lang="en-US" dirty="0"/>
-              <a:t>What is your plan for 5 years</a:t>
-            </a:r>
-          </a:p>
-          <a:p>
-            <a:pPr lvl="1"/>
-            <a:r>
-              <a:rPr lang="en-US" dirty="0"/>
-              <a:t>When</a:t>
-            </a:r>
-            <a:r>
-              <a:rPr lang="en-US" baseline="0" dirty="0"/>
-              <a:t> did you fail</a:t>
-            </a:r>
-          </a:p>
-          <a:p>
-            <a:pPr lvl="2"/>
-            <a:r>
-              <a:rPr lang="en-US" baseline="0" dirty="0"/>
-              <a:t>What have you learned from your mistakes</a:t>
-            </a:r>
-          </a:p>
-          <a:p>
-            <a:pPr lvl="1"/>
-            <a:r>
-              <a:rPr lang="en-US" dirty="0"/>
-              <a:t>How</a:t>
-            </a:r>
-            <a:r>
-              <a:rPr lang="en-US" baseline="0" dirty="0"/>
-              <a:t> much money do you want</a:t>
-            </a:r>
-          </a:p>
-          <a:p>
-            <a:pPr lvl="1"/>
-            <a:r>
-              <a:rPr lang="en-US" baseline="0" dirty="0"/>
-              <a:t>Can we contact your references</a:t>
-            </a:r>
-          </a:p>
-          <a:p>
-            <a:pPr lvl="1"/>
-            <a:r>
-              <a:rPr lang="en-US" dirty="0"/>
-              <a:t>Ability to think on your feet – Not technical</a:t>
-            </a:r>
-          </a:p>
-          <a:p>
-            <a:pPr lvl="1"/>
-            <a:r>
-              <a:rPr lang="en-US" dirty="0"/>
-              <a:t>Availability</a:t>
-            </a:r>
-          </a:p>
-          <a:p>
-            <a:pPr lvl="2"/>
-            <a:r>
-              <a:rPr lang="en-US" dirty="0"/>
-              <a:t>Two week notice or loose ends that need to be tied up (large projects).</a:t>
-            </a:r>
-          </a:p>
-          <a:p>
-            <a:pPr lvl="1"/>
-            <a:r>
-              <a:rPr lang="en-US" dirty="0"/>
-              <a:t>Motivation for this position</a:t>
-            </a:r>
+              <a:t>Ask questions about the “perks” to </a:t>
+            </a:r>
+            <a:r>
+              <a:rPr lang="en-US" u="sng" dirty="0"/>
+              <a:t>every person</a:t>
+            </a:r>
+            <a:r>
+              <a:rPr lang="en-US" dirty="0"/>
+              <a:t> who interviews you.</a:t>
+            </a:r>
+          </a:p>
+          <a:p>
+            <a:r>
+              <a:rPr lang="en-US" dirty="0"/>
+              <a:t>Try to find out about people you may be interview with</a:t>
+            </a:r>
+          </a:p>
+          <a:p>
+            <a:pPr marL="0" indent="0">
+              <a:buNone/>
+            </a:pPr>
+            <a:endParaRPr lang="en-US" dirty="0"/>
           </a:p>
         </p:txBody>
       </p:sp>
     </p:spTree>
     <p:extLst>
       <p:ext uri="{BB962C8B-B14F-4D97-AF65-F5344CB8AC3E}">
-        <p14:creationId xmlns:p14="http://schemas.microsoft.com/office/powerpoint/2010/main" val="568820236"/>
+        <p14:creationId xmlns:p14="http://schemas.microsoft.com/office/powerpoint/2010/main" val="2893273955"/>
       </p:ext>
     </p:extLst>
   </p:cSld>
@@ -8967,7 +10379,13 @@
       </p:grpSpPr>
       <p:sp>
         <p:nvSpPr>
-          <p:cNvPr id="2" name="Title 1"/>
+          <p:cNvPr id="2" name="Title 1">
+            <a:extLst>
+              <a:ext uri="{FF2B5EF4-FFF2-40B4-BE49-F238E27FC236}">
+                <a16:creationId xmlns:a16="http://schemas.microsoft.com/office/drawing/2014/main" id="{F0E21760-9740-F84A-9E49-B689F130B1B8}"/>
+              </a:ext>
+            </a:extLst>
+          </p:cNvPr>
           <p:cNvSpPr>
             <a:spLocks noGrp="1"/>
           </p:cNvSpPr>
@@ -8982,14 +10400,20 @@
           <a:p>
             <a:r>
               <a:rPr lang="en-US" dirty="0"/>
-              <a:t>Technical or follow-up</a:t>
-            </a:r>
-          </a:p>
-        </p:txBody>
-      </p:sp>
-      <p:sp>
-        <p:nvSpPr>
-          <p:cNvPr id="3" name="Content Placeholder 2"/>
+              <a:t>Remote Work?!?</a:t>
+            </a:r>
+          </a:p>
+        </p:txBody>
+      </p:sp>
+      <p:sp>
+        <p:nvSpPr>
+          <p:cNvPr id="3" name="Content Placeholder 2">
+            <a:extLst>
+              <a:ext uri="{FF2B5EF4-FFF2-40B4-BE49-F238E27FC236}">
+                <a16:creationId xmlns:a16="http://schemas.microsoft.com/office/drawing/2014/main" id="{B5F8AE68-B506-6B40-86D8-7A0DAFA4687B}"/>
+              </a:ext>
+            </a:extLst>
+          </p:cNvPr>
           <p:cNvSpPr>
             <a:spLocks noGrp="1"/>
           </p:cNvSpPr>
@@ -8999,79 +10423,94 @@
         </p:nvSpPr>
         <p:spPr/>
         <p:txBody>
-          <a:bodyPr>
-            <a:normAutofit/>
-          </a:bodyPr>
-          <a:lstStyle/>
-          <a:p>
-            <a:r>
-              <a:rPr lang="en-US" dirty="0"/>
-              <a:t>Calm down (remember you’re smart) you made it through one interview</a:t>
-            </a:r>
-          </a:p>
-          <a:p>
-            <a:r>
-              <a:rPr lang="en-US" dirty="0"/>
-              <a:t>Plan on getting to the interview earlier (10-15 minutes)</a:t>
-            </a:r>
-          </a:p>
-          <a:p>
-            <a:r>
-              <a:rPr lang="en-US" dirty="0"/>
-              <a:t>If you need caffeine have your normal amount (don’t power bomb 2 Rock Stars to be “on”)</a:t>
-            </a:r>
-          </a:p>
-          <a:p>
-            <a:r>
-              <a:rPr lang="en-US" dirty="0"/>
-              <a:t>Lets</a:t>
-            </a:r>
-            <a:r>
-              <a:rPr lang="en-US" baseline="0" dirty="0"/>
-              <a:t> look at some questions:</a:t>
+          <a:bodyPr/>
+          <a:lstStyle/>
+          <a:p>
+            <a:r>
+              <a:rPr lang="en-US" dirty="0"/>
+              <a:t>Welcome to 2020!!!</a:t>
+            </a:r>
+          </a:p>
+          <a:p>
+            <a:r>
+              <a:rPr lang="en-US" dirty="0"/>
+              <a:t>You should be able to adapt… to everything</a:t>
+            </a:r>
+          </a:p>
+          <a:p>
+            <a:r>
+              <a:rPr lang="en-US" dirty="0"/>
+              <a:t>How do you remote work</a:t>
+            </a:r>
+          </a:p>
+          <a:p>
+            <a:r>
+              <a:rPr lang="en-US" dirty="0"/>
+              <a:t>Be prepared to be on video</a:t>
+            </a:r>
+          </a:p>
+          <a:p>
+            <a:r>
+              <a:rPr lang="en-US" dirty="0"/>
+              <a:t>Install video clients before the interview</a:t>
             </a:r>
           </a:p>
           <a:p>
             <a:pPr lvl="1"/>
             <a:r>
               <a:rPr lang="en-US" dirty="0"/>
-              <a:t>The</a:t>
-            </a:r>
-            <a:r>
-              <a:rPr lang="en-US" baseline="0" dirty="0"/>
-              <a:t> list of questions come from SQL Server 2000 and above.</a:t>
+              <a:t>Make sure you client is installed</a:t>
             </a:r>
           </a:p>
           <a:p>
             <a:pPr lvl="1"/>
             <a:r>
-              <a:rPr lang="en-US" baseline="0" dirty="0"/>
-              <a:t>We should all know these questions</a:t>
-            </a:r>
-          </a:p>
-          <a:p>
-            <a:pPr lvl="1"/>
-            <a:r>
-              <a:rPr lang="en-US" baseline="0" dirty="0"/>
-              <a:t>We’ve adapted  some of the questions for “interview” style</a:t>
-            </a:r>
-            <a:r>
-              <a:rPr lang="en-US" dirty="0"/>
-              <a:t> but the information is pretty basic</a:t>
-            </a:r>
-          </a:p>
-          <a:p>
-            <a:r>
-              <a:rPr lang="en-US" dirty="0"/>
-              <a:t>Remember to stay calm, if you don’t know something say so.</a:t>
-            </a:r>
-          </a:p>
-        </p:txBody>
-      </p:sp>
+              <a:rPr lang="en-US" dirty="0"/>
+              <a:t>Try to use the client </a:t>
+            </a:r>
+          </a:p>
+          <a:p>
+            <a:r>
+              <a:rPr lang="en-US" dirty="0"/>
+              <a:t>Don’t be shy, but be prepared</a:t>
+            </a:r>
+          </a:p>
+        </p:txBody>
+      </p:sp>
+      <p:pic>
+        <p:nvPicPr>
+          <p:cNvPr id="5" name="Picture 4" descr="A person wearing a suit and tie&#10;&#10;Description automatically generated">
+            <a:extLst>
+              <a:ext uri="{FF2B5EF4-FFF2-40B4-BE49-F238E27FC236}">
+                <a16:creationId xmlns:a16="http://schemas.microsoft.com/office/drawing/2014/main" id="{7EACC887-53BE-EB47-99B4-AB34D9CABD30}"/>
+              </a:ext>
+            </a:extLst>
+          </p:cNvPr>
+          <p:cNvPicPr>
+            <a:picLocks noChangeAspect="1"/>
+          </p:cNvPicPr>
+          <p:nvPr/>
+        </p:nvPicPr>
+        <p:blipFill>
+          <a:blip r:embed="rId3"/>
+          <a:stretch>
+            <a:fillRect/>
+          </a:stretch>
+        </p:blipFill>
+        <p:spPr>
+          <a:xfrm>
+            <a:off x="8149045" y="1897185"/>
+            <a:ext cx="3357155" cy="4196443"/>
+          </a:xfrm>
+          <a:prstGeom prst="rect">
+            <a:avLst/>
+          </a:prstGeom>
+        </p:spPr>
+      </p:pic>
     </p:spTree>
     <p:extLst>
       <p:ext uri="{BB962C8B-B14F-4D97-AF65-F5344CB8AC3E}">
-        <p14:creationId xmlns:p14="http://schemas.microsoft.com/office/powerpoint/2010/main" val="2232111454"/>
+        <p14:creationId xmlns:p14="http://schemas.microsoft.com/office/powerpoint/2010/main" val="2959983045"/>
       </p:ext>
     </p:extLst>
   </p:cSld>

</xml_diff>